<commit_message>
RSA and related problems, slides5f 6m
</commit_message>
<xml_diff>
--- a/spring11/slides11/slides5f.pptx
+++ b/spring11/slides11/slides5f.pptx
@@ -5,10 +5,10 @@
     <p:sldMasterId id="2147483678" r:id="rId1"/>
   </p:sldMasterIdLst>
   <p:notesMasterIdLst>
-    <p:notesMasterId r:id="rId35"/>
+    <p:notesMasterId r:id="rId36"/>
   </p:notesMasterIdLst>
   <p:handoutMasterIdLst>
-    <p:handoutMasterId r:id="rId36"/>
+    <p:handoutMasterId r:id="rId37"/>
   </p:handoutMasterIdLst>
   <p:sldIdLst>
     <p:sldId id="388" r:id="rId2"/>
@@ -35,42 +35,43 @@
     <p:sldId id="426" r:id="rId23"/>
     <p:sldId id="428" r:id="rId24"/>
     <p:sldId id="429" r:id="rId25"/>
-    <p:sldId id="375" r:id="rId26"/>
-    <p:sldId id="412" r:id="rId27"/>
-    <p:sldId id="417" r:id="rId28"/>
-    <p:sldId id="413" r:id="rId29"/>
-    <p:sldId id="378" r:id="rId30"/>
-    <p:sldId id="381" r:id="rId31"/>
-    <p:sldId id="402" r:id="rId32"/>
-    <p:sldId id="425" r:id="rId33"/>
-    <p:sldId id="423" r:id="rId34"/>
+    <p:sldId id="430" r:id="rId26"/>
+    <p:sldId id="375" r:id="rId27"/>
+    <p:sldId id="412" r:id="rId28"/>
+    <p:sldId id="417" r:id="rId29"/>
+    <p:sldId id="413" r:id="rId30"/>
+    <p:sldId id="378" r:id="rId31"/>
+    <p:sldId id="381" r:id="rId32"/>
+    <p:sldId id="402" r:id="rId33"/>
+    <p:sldId id="425" r:id="rId34"/>
+    <p:sldId id="423" r:id="rId35"/>
   </p:sldIdLst>
   <p:sldSz cx="9144000" cy="6858000" type="screen4x3"/>
   <p:notesSz cx="7315200" cy="9601200"/>
   <p:embeddedFontLst>
     <p:embeddedFont>
       <p:font typeface="Comic Sans MS"/>
-      <p:regular r:id="rId37"/>
-      <p:bold r:id="rId38"/>
+      <p:regular r:id="rId38"/>
+      <p:bold r:id="rId39"/>
     </p:embeddedFont>
     <p:embeddedFont>
       <p:font typeface="EURM10"/>
-      <p:regular r:id="rId39"/>
+      <p:regular r:id="rId40"/>
     </p:embeddedFont>
     <p:embeddedFont>
       <p:font typeface="cmsy10"/>
-      <p:regular r:id="rId40"/>
+      <p:regular r:id="rId41"/>
     </p:embeddedFont>
     <p:embeddedFont>
       <p:font typeface="Euclid Symbol" charset="2"/>
-      <p:regular r:id="rId41"/>
-      <p:bold r:id="rId42"/>
-      <p:italic r:id="rId43"/>
-      <p:boldItalic r:id="rId44"/>
+      <p:regular r:id="rId42"/>
+      <p:bold r:id="rId43"/>
+      <p:italic r:id="rId44"/>
+      <p:boldItalic r:id="rId45"/>
     </p:embeddedFont>
   </p:embeddedFontLst>
   <p:custDataLst>
-    <p:tags r:id="rId46"/>
+    <p:tags r:id="rId47"/>
   </p:custDataLst>
   <p:defaultTextStyle>
     <a:defPPr>
@@ -2377,7 +2378,7 @@
       </p:grpSpPr>
       <p:sp>
         <p:nvSpPr>
-          <p:cNvPr id="29698" name="Rectangle 7"/>
+          <p:cNvPr id="27650" name="Rectangle 7"/>
           <p:cNvSpPr>
             <a:spLocks noGrp="1" noChangeArrowheads="1"/>
           </p:cNvSpPr>
@@ -2392,7 +2393,7 @@
           <a:bodyPr/>
           <a:lstStyle/>
           <a:p>
-            <a:fld id="{B486D7DD-3D87-4D67-ACB2-B2DB69A39DA5}" type="slidenum">
+            <a:fld id="{51D64DB6-C550-4B5F-9DBB-8254A936F031}" type="slidenum">
               <a:rPr lang="en-US" smtClean="0"/>
               <a:pPr/>
               <a:t>25</a:t>
@@ -2403,7 +2404,7 @@
       </p:sp>
       <p:sp>
         <p:nvSpPr>
-          <p:cNvPr id="29699" name="Rectangle 2"/>
+          <p:cNvPr id="27651" name="Rectangle 2"/>
           <p:cNvSpPr>
             <a:spLocks noGrp="1" noRot="1" noChangeAspect="1" noChangeArrowheads="1" noTextEdit="1"/>
           </p:cNvSpPr>
@@ -2417,7 +2418,7 @@
       </p:sp>
       <p:sp>
         <p:nvSpPr>
-          <p:cNvPr id="29700" name="Rectangle 3"/>
+          <p:cNvPr id="27652" name="Rectangle 3"/>
           <p:cNvSpPr>
             <a:spLocks noGrp="1" noChangeArrowheads="1"/>
           </p:cNvSpPr>
@@ -2434,7 +2435,7 @@
           <a:lstStyle/>
           <a:p>
             <a:pPr eaLnBrk="1" hangingPunct="1"/>
-            <a:endParaRPr lang="en-US" dirty="0" smtClean="0"/>
+            <a:endParaRPr lang="en-US" smtClean="0"/>
           </a:p>
         </p:txBody>
       </p:sp>
@@ -2522,7 +2523,7 @@
           <a:lstStyle/>
           <a:p>
             <a:pPr eaLnBrk="1" hangingPunct="1"/>
-            <a:endParaRPr lang="en-US" smtClean="0"/>
+            <a:endParaRPr lang="en-US" dirty="0" smtClean="0"/>
           </a:p>
         </p:txBody>
       </p:sp>
@@ -2729,7 +2730,7 @@
       </p:grpSpPr>
       <p:sp>
         <p:nvSpPr>
-          <p:cNvPr id="32770" name="Rectangle 7"/>
+          <p:cNvPr id="29698" name="Rectangle 7"/>
           <p:cNvSpPr>
             <a:spLocks noGrp="1" noChangeArrowheads="1"/>
           </p:cNvSpPr>
@@ -2744,7 +2745,7 @@
           <a:bodyPr/>
           <a:lstStyle/>
           <a:p>
-            <a:fld id="{402FAC0C-B957-4153-8797-F85E34E6598D}" type="slidenum">
+            <a:fld id="{B486D7DD-3D87-4D67-ACB2-B2DB69A39DA5}" type="slidenum">
               <a:rPr lang="en-US" smtClean="0"/>
               <a:pPr/>
               <a:t>29</a:t>
@@ -2755,7 +2756,7 @@
       </p:sp>
       <p:sp>
         <p:nvSpPr>
-          <p:cNvPr id="32771" name="Rectangle 2"/>
+          <p:cNvPr id="29699" name="Rectangle 2"/>
           <p:cNvSpPr>
             <a:spLocks noGrp="1" noRot="1" noChangeAspect="1" noChangeArrowheads="1" noTextEdit="1"/>
           </p:cNvSpPr>
@@ -2769,7 +2770,7 @@
       </p:sp>
       <p:sp>
         <p:nvSpPr>
-          <p:cNvPr id="32772" name="Rectangle 3"/>
+          <p:cNvPr id="29700" name="Rectangle 3"/>
           <p:cNvSpPr>
             <a:spLocks noGrp="1" noChangeArrowheads="1"/>
           </p:cNvSpPr>
@@ -2905,6 +2906,94 @@
       </p:grpSpPr>
       <p:sp>
         <p:nvSpPr>
+          <p:cNvPr id="32770" name="Rectangle 7"/>
+          <p:cNvSpPr>
+            <a:spLocks noGrp="1" noChangeArrowheads="1"/>
+          </p:cNvSpPr>
+          <p:nvPr>
+            <p:ph type="sldNum" sz="quarter" idx="5"/>
+          </p:nvPr>
+        </p:nvSpPr>
+        <p:spPr>
+          <a:noFill/>
+        </p:spPr>
+        <p:txBody>
+          <a:bodyPr/>
+          <a:lstStyle/>
+          <a:p>
+            <a:fld id="{402FAC0C-B957-4153-8797-F85E34E6598D}" type="slidenum">
+              <a:rPr lang="en-US" smtClean="0"/>
+              <a:pPr/>
+              <a:t>30</a:t>
+            </a:fld>
+            <a:endParaRPr lang="en-US" smtClean="0"/>
+          </a:p>
+        </p:txBody>
+      </p:sp>
+      <p:sp>
+        <p:nvSpPr>
+          <p:cNvPr id="32771" name="Rectangle 2"/>
+          <p:cNvSpPr>
+            <a:spLocks noGrp="1" noRot="1" noChangeAspect="1" noChangeArrowheads="1" noTextEdit="1"/>
+          </p:cNvSpPr>
+          <p:nvPr>
+            <p:ph type="sldImg"/>
+          </p:nvPr>
+        </p:nvSpPr>
+        <p:spPr>
+          <a:ln/>
+        </p:spPr>
+      </p:sp>
+      <p:sp>
+        <p:nvSpPr>
+          <p:cNvPr id="32772" name="Rectangle 3"/>
+          <p:cNvSpPr>
+            <a:spLocks noGrp="1" noChangeArrowheads="1"/>
+          </p:cNvSpPr>
+          <p:nvPr>
+            <p:ph type="body" idx="1"/>
+          </p:nvPr>
+        </p:nvSpPr>
+        <p:spPr>
+          <a:noFill/>
+          <a:ln/>
+        </p:spPr>
+        <p:txBody>
+          <a:bodyPr/>
+          <a:lstStyle/>
+          <a:p>
+            <a:pPr eaLnBrk="1" hangingPunct="1"/>
+            <a:endParaRPr lang="en-US" smtClean="0"/>
+          </a:p>
+        </p:txBody>
+      </p:sp>
+    </p:spTree>
+  </p:cSld>
+  <p:clrMapOvr>
+    <a:masterClrMapping/>
+  </p:clrMapOvr>
+</p:notes>
+</file>
+
+<file path=ppt/notesSlides/notesSlide31.xml><?xml version="1.0" encoding="utf-8"?>
+<p:notes xmlns:a="http://schemas.openxmlformats.org/drawingml/2006/main" xmlns:r="http://schemas.openxmlformats.org/officeDocument/2006/relationships" xmlns:mc="http://schemas.openxmlformats.org/markup-compatibility/2006" xmlns:mv="urn:schemas-microsoft-com:mac:vml" xmlns:p="http://schemas.openxmlformats.org/presentationml/2006/main" mc:Ignorable="mv" mc:PreserveAttributes="mv:*">
+  <p:cSld>
+    <p:spTree>
+      <p:nvGrpSpPr>
+        <p:cNvPr id="1" name=""/>
+        <p:cNvGrpSpPr/>
+        <p:nvPr/>
+      </p:nvGrpSpPr>
+      <p:grpSpPr>
+        <a:xfrm>
+          <a:off x="0" y="0"/>
+          <a:ext cx="0" cy="0"/>
+          <a:chOff x="0" y="0"/>
+          <a:chExt cx="0" cy="0"/>
+        </a:xfrm>
+      </p:grpSpPr>
+      <p:sp>
+        <p:nvSpPr>
           <p:cNvPr id="36866" name="Rectangle 7"/>
           <p:cNvSpPr>
             <a:spLocks noGrp="1" noChangeArrowheads="1"/>
@@ -2923,7 +3012,7 @@
             <a:fld id="{F4553F37-EB1E-4C01-BA0C-1C0E4E54BB56}" type="slidenum">
               <a:rPr lang="en-US" smtClean="0"/>
               <a:pPr/>
-              <a:t>30</a:t>
+              <a:t>31</a:t>
             </a:fld>
             <a:endParaRPr lang="en-US" smtClean="0"/>
           </a:p>
@@ -2974,7 +3063,7 @@
 </p:notes>
 </file>
 
-<file path=ppt/notesSlides/notesSlide31.xml><?xml version="1.0" encoding="utf-8"?>
+<file path=ppt/notesSlides/notesSlide32.xml><?xml version="1.0" encoding="utf-8"?>
 <p:notes xmlns:a="http://schemas.openxmlformats.org/drawingml/2006/main" xmlns:r="http://schemas.openxmlformats.org/officeDocument/2006/relationships" xmlns:mc="http://schemas.openxmlformats.org/markup-compatibility/2006" xmlns:mv="urn:schemas-microsoft-com:mac:vml" xmlns:p="http://schemas.openxmlformats.org/presentationml/2006/main" mc:Ignorable="mv" mc:PreserveAttributes="mv:*">
   <p:cSld>
     <p:spTree>
@@ -3107,7 +3196,7 @@
 </p:notes>
 </file>
 
-<file path=ppt/notesSlides/notesSlide32.xml><?xml version="1.0" encoding="utf-8"?>
+<file path=ppt/notesSlides/notesSlide33.xml><?xml version="1.0" encoding="utf-8"?>
 <p:notes xmlns:a="http://schemas.openxmlformats.org/drawingml/2006/main" xmlns:r="http://schemas.openxmlformats.org/officeDocument/2006/relationships" xmlns:mc="http://schemas.openxmlformats.org/markup-compatibility/2006" xmlns:mv="urn:schemas-microsoft-com:mac:vml" xmlns:p="http://schemas.openxmlformats.org/presentationml/2006/main" mc:Ignorable="mv" mc:PreserveAttributes="mv:*">
   <p:cSld>
     <p:spTree>
@@ -3144,7 +3233,7 @@
             <a:fld id="{51D64DB6-C550-4B5F-9DBB-8254A936F031}" type="slidenum">
               <a:rPr lang="en-US" smtClean="0"/>
               <a:pPr/>
-              <a:t>32</a:t>
+              <a:t>33</a:t>
             </a:fld>
             <a:endParaRPr lang="en-US" smtClean="0"/>
           </a:p>
@@ -3195,7 +3284,7 @@
 </p:notes>
 </file>
 
-<file path=ppt/notesSlides/notesSlide33.xml><?xml version="1.0" encoding="utf-8"?>
+<file path=ppt/notesSlides/notesSlide34.xml><?xml version="1.0" encoding="utf-8"?>
 <p:notes xmlns:a="http://schemas.openxmlformats.org/drawingml/2006/main" xmlns:r="http://schemas.openxmlformats.org/officeDocument/2006/relationships" xmlns:mc="http://schemas.openxmlformats.org/markup-compatibility/2006" xmlns:mv="urn:schemas-microsoft-com:mac:vml" xmlns:p="http://schemas.openxmlformats.org/presentationml/2006/main" mc:Ignorable="mv" mc:PreserveAttributes="mv:*">
   <p:cSld>
     <p:spTree>
@@ -3232,7 +3321,7 @@
             <a:fld id="{B486D7DD-3D87-4D67-ACB2-B2DB69A39DA5}" type="slidenum">
               <a:rPr lang="en-US" smtClean="0"/>
               <a:pPr/>
-              <a:t>33</a:t>
+              <a:t>34</a:t>
             </a:fld>
             <a:endParaRPr lang="en-US" smtClean="0"/>
           </a:p>
@@ -3982,11 +4071,7 @@
             </a:r>
             <a:r>
               <a:rPr lang="en-US" sz="1200" dirty="0" smtClean="0"/>
-              <a:t> 5F.‹</a:t>
-            </a:r>
-            <a:r>
-              <a:rPr lang="en-US" sz="1200" dirty="0" smtClean="0"/>
-              <a:t>#›</a:t>
+              <a:t> 5F.‹#›</a:t>
             </a:r>
             <a:endParaRPr lang="en-US" sz="1200" dirty="0"/>
           </a:p>
@@ -4157,11 +4242,7 @@
             </a:r>
             <a:r>
               <a:rPr lang="en-US" sz="1200" dirty="0" smtClean="0"/>
-              <a:t> 5F.‹</a:t>
-            </a:r>
-            <a:r>
-              <a:rPr lang="en-US" sz="1200" dirty="0" smtClean="0"/>
-              <a:t>#›</a:t>
+              <a:t> 5F.‹#›</a:t>
             </a:r>
             <a:endParaRPr lang="en-US" sz="1200" dirty="0"/>
           </a:p>
@@ -4350,11 +4431,7 @@
             </a:r>
             <a:r>
               <a:rPr lang="en-US" sz="1200" dirty="0" smtClean="0"/>
-              <a:t> 5F.‹</a:t>
-            </a:r>
-            <a:r>
-              <a:rPr lang="en-US" sz="1200" dirty="0" smtClean="0"/>
-              <a:t>#›</a:t>
+              <a:t> 5F.‹#›</a:t>
             </a:r>
             <a:endParaRPr lang="en-US" sz="1200" dirty="0"/>
           </a:p>
@@ -4996,11 +5073,7 @@
             </a:r>
             <a:r>
               <a:rPr lang="en-US" sz="1200" dirty="0" smtClean="0"/>
-              <a:t> 5F</a:t>
-            </a:r>
-            <a:r>
-              <a:rPr lang="en-US" sz="1200" dirty="0" smtClean="0"/>
-              <a:t>.‹#›</a:t>
+              <a:t> 5F.‹#›</a:t>
             </a:r>
             <a:endParaRPr lang="en-US" sz="1200" dirty="0"/>
           </a:p>
@@ -5057,22 +5130,7 @@
                 <a:uFillTx/>
                 <a:latin typeface="Comic Sans MS" pitchFamily="66" charset="0"/>
               </a:rPr>
-              <a:t>Albert R </a:t>
-            </a:r>
-            <a:r>
-              <a:rPr kumimoji="0" lang="en-US" sz="1200" b="0" i="0" u="none" strike="noStrike" kern="1200" cap="none" spc="0" normalizeH="0" baseline="0" noProof="0" dirty="0" smtClean="0">
-                <a:ln>
-                  <a:noFill/>
-                </a:ln>
-                <a:solidFill>
-                  <a:schemeClr val="tx1"/>
-                </a:solidFill>
-                <a:effectLst/>
-                <a:uLnTx/>
-                <a:uFillTx/>
-                <a:latin typeface="Comic Sans MS" pitchFamily="66" charset="0"/>
-              </a:rPr>
-              <a:t>Meyer         March 4, 2011</a:t>
+              <a:t>Albert R Meyer         March 4, 2011</a:t>
             </a:r>
             <a:endParaRPr kumimoji="0" lang="en-US" sz="1200" b="0" i="0" u="none" strike="noStrike" kern="1200" cap="none" spc="0" normalizeH="0" baseline="0" noProof="0" dirty="0">
               <a:ln>
@@ -5583,13 +5641,8 @@
             <a:pPr eaLnBrk="1" hangingPunct="1"/>
             <a:r>
               <a:rPr lang="en-US" sz="7200" b="1" dirty="0" smtClean="0"/>
-              <a:t>Euler’s </a:t>
-            </a:r>
-            <a:r>
-              <a:rPr lang="en-US" sz="7200" b="1" dirty="0" smtClean="0"/>
-              <a:t>Theorem</a:t>
-            </a:r>
-            <a:endParaRPr lang="en-US" sz="7200" b="1" dirty="0" smtClean="0"/>
+              <a:t>Euler’s Theorem</a:t>
+            </a:r>
           </a:p>
         </p:txBody>
       </p:sp>
@@ -5668,78 +5721,6 @@
               </a:rPr>
               <a:t>6.042J/18.062J</a:t>
             </a:r>
-          </a:p>
-        </p:txBody>
-      </p:sp>
-      <p:sp>
-        <p:nvSpPr>
-          <p:cNvPr id="2053" name="TextBox 4"/>
-          <p:cNvSpPr txBox="1">
-            <a:spLocks noChangeArrowheads="1"/>
-          </p:cNvSpPr>
-          <p:nvPr>
-            <p:custDataLst>
-              <p:tags r:id="rId1"/>
-            </p:custDataLst>
-          </p:nvPr>
-        </p:nvSpPr>
-        <p:spPr bwMode="auto">
-          <a:xfrm>
-            <a:off x="0" y="7112000"/>
-            <a:ext cx="9144000" cy="2215991"/>
-          </a:xfrm>
-          <a:prstGeom prst="rect">
-            <a:avLst/>
-          </a:prstGeom>
-          <a:noFill/>
-          <a:ln w="9525">
-            <a:noFill/>
-            <a:miter lim="800000"/>
-            <a:headEnd/>
-            <a:tailEnd/>
-          </a:ln>
-        </p:spPr>
-        <p:txBody>
-          <a:bodyPr>
-            <a:spAutoFit/>
-          </a:bodyPr>
-          <a:lstStyle/>
-          <a:p>
-            <a:r>
-              <a:rPr lang="en-US" dirty="0" err="1"/>
-              <a:t>TexPoint</a:t>
-            </a:r>
-            <a:r>
-              <a:rPr lang="en-US" dirty="0"/>
-              <a:t> fonts used in EMF. </a:t>
-            </a:r>
-          </a:p>
-          <a:p>
-            <a:r>
-              <a:rPr lang="en-US" dirty="0"/>
-              <a:t>Read the </a:t>
-            </a:r>
-            <a:r>
-              <a:rPr lang="en-US" dirty="0" err="1"/>
-              <a:t>TexPoint</a:t>
-            </a:r>
-            <a:r>
-              <a:rPr lang="en-US" dirty="0"/>
-              <a:t> manual before you delete this box.: </a:t>
-            </a:r>
-            <a:r>
-              <a:rPr lang="en-US" dirty="0">
-                <a:latin typeface="EURM10" pitchFamily="34" charset="0"/>
-              </a:rPr>
-              <a:t>A</a:t>
-            </a:r>
-            <a:r>
-              <a:rPr lang="en-US" dirty="0">
-                <a:latin typeface="Euclid Symbol" charset="2"/>
-              </a:rPr>
-              <a:t>A</a:t>
-            </a:r>
-            <a:endParaRPr lang="en-US" dirty="0"/>
           </a:p>
         </p:txBody>
       </p:sp>
@@ -6867,9 +6848,6 @@
                     <p:cTn id="3" fill="hold">
                       <p:stCondLst>
                         <p:cond delay="indefinite"/>
-                        <p:cond evt="onBegin" delay="0">
-                          <p:tn val="2"/>
-                        </p:cond>
                       </p:stCondLst>
                       <p:childTnLst>
                         <p:par>
@@ -6879,7 +6857,7 @@
                             </p:stCondLst>
                             <p:childTnLst>
                               <p:par>
-                                <p:cTn id="5" presetID="49" presetClass="entr" presetSubtype="0" decel="100000" fill="hold" grpId="0" nodeType="afterEffect">
+                                <p:cTn id="5" presetID="2" presetClass="entr" presetSubtype="4" accel="50000" decel="50000" fill="hold" grpId="1" nodeType="clickEffect">
                                   <p:stCondLst>
                                     <p:cond delay="0"/>
                                   </p:stCondLst>
@@ -6903,82 +6881,51 @@
                                       </p:to>
                                     </p:set>
                                     <p:anim calcmode="lin" valueType="num">
-                                      <p:cBhvr>
-                                        <p:cTn id="7" dur="1000" fill="hold"/>
+                                      <p:cBhvr additive="base">
+                                        <p:cTn id="7" dur="500" fill="hold"/>
                                         <p:tgtEl>
                                           <p:spTgt spid="385030"/>
                                         </p:tgtEl>
                                         <p:attrNameLst>
-                                          <p:attrName>ppt_w</p:attrName>
+                                          <p:attrName>ppt_x</p:attrName>
                                         </p:attrNameLst>
                                       </p:cBhvr>
                                       <p:tavLst>
                                         <p:tav tm="0">
                                           <p:val>
-                                            <p:fltVal val="0"/>
+                                            <p:strVal val="#ppt_x"/>
                                           </p:val>
                                         </p:tav>
                                         <p:tav tm="100000">
                                           <p:val>
-                                            <p:strVal val="#ppt_w"/>
+                                            <p:strVal val="#ppt_x"/>
                                           </p:val>
                                         </p:tav>
                                       </p:tavLst>
                                     </p:anim>
                                     <p:anim calcmode="lin" valueType="num">
-                                      <p:cBhvr>
-                                        <p:cTn id="8" dur="1000" fill="hold"/>
+                                      <p:cBhvr additive="base">
+                                        <p:cTn id="8" dur="500" fill="hold"/>
                                         <p:tgtEl>
                                           <p:spTgt spid="385030"/>
                                         </p:tgtEl>
                                         <p:attrNameLst>
-                                          <p:attrName>ppt_h</p:attrName>
+                                          <p:attrName>ppt_y</p:attrName>
                                         </p:attrNameLst>
                                       </p:cBhvr>
                                       <p:tavLst>
                                         <p:tav tm="0">
                                           <p:val>
-                                            <p:fltVal val="0"/>
+                                            <p:strVal val="1+#ppt_h/2"/>
                                           </p:val>
                                         </p:tav>
                                         <p:tav tm="100000">
                                           <p:val>
-                                            <p:strVal val="#ppt_h"/>
+                                            <p:strVal val="#ppt_y"/>
                                           </p:val>
                                         </p:tav>
                                       </p:tavLst>
                                     </p:anim>
-                                    <p:anim calcmode="lin" valueType="num">
-                                      <p:cBhvr>
-                                        <p:cTn id="9" dur="1000" fill="hold"/>
-                                        <p:tgtEl>
-                                          <p:spTgt spid="385030"/>
-                                        </p:tgtEl>
-                                        <p:attrNameLst>
-                                          <p:attrName>style.rotation</p:attrName>
-                                        </p:attrNameLst>
-                                      </p:cBhvr>
-                                      <p:tavLst>
-                                        <p:tav tm="0">
-                                          <p:val>
-                                            <p:fltVal val="360"/>
-                                          </p:val>
-                                        </p:tav>
-                                        <p:tav tm="100000">
-                                          <p:val>
-                                            <p:fltVal val="0"/>
-                                          </p:val>
-                                        </p:tav>
-                                      </p:tavLst>
-                                    </p:anim>
-                                    <p:animEffect transition="in" filter="fade">
-                                      <p:cBhvr>
-                                        <p:cTn id="10" dur="1000"/>
-                                        <p:tgtEl>
-                                          <p:spTgt spid="385030"/>
-                                        </p:tgtEl>
-                                      </p:cBhvr>
-                                    </p:animEffect>
                                   </p:childTnLst>
                                 </p:cTn>
                               </p:par>
@@ -7010,7 +6957,7 @@
       </p:par>
     </p:tnLst>
     <p:bldLst>
-      <p:bldP spid="385030" grpId="0" animBg="1"/>
+      <p:bldP spid="385030" grpId="1" animBg="1"/>
     </p:bldLst>
   </p:timing>
 </p:sld>
@@ -7097,23 +7044,7 @@
                   <a:srgbClr val="FF00FF"/>
                 </a:solidFill>
               </a:rPr>
-              <a:t>Fermat’s</a:t>
-            </a:r>
-            <a:r>
-              <a:rPr lang="en-US" dirty="0" smtClean="0">
-                <a:solidFill>
-                  <a:srgbClr val="FF00FF"/>
-                </a:solidFill>
-              </a:rPr>
-              <a:t> “Little” </a:t>
-            </a:r>
-            <a:r>
-              <a:rPr lang="en-US" dirty="0" smtClean="0">
-                <a:solidFill>
-                  <a:srgbClr val="FF00FF"/>
-                </a:solidFill>
-              </a:rPr>
-              <a:t>Theorem</a:t>
+              <a:t>Fermat’s “Little” Theorem</a:t>
             </a:r>
           </a:p>
         </p:txBody>
@@ -7145,13 +7076,8 @@
             </a:pPr>
             <a:r>
               <a:rPr lang="en-US" sz="6600" dirty="0" smtClean="0"/>
-              <a:t>special </a:t>
-            </a:r>
-            <a:r>
-              <a:rPr lang="en-US" sz="6600" dirty="0" smtClean="0"/>
-              <a:t>case:</a:t>
-            </a:r>
-            <a:endParaRPr lang="en-US" sz="6600" dirty="0" smtClean="0"/>
+              <a:t>special case:</a:t>
+            </a:r>
           </a:p>
           <a:p>
             <a:pPr algn="ctr" eaLnBrk="1" hangingPunct="1">
@@ -7504,18 +7430,7 @@
                 </a:solidFill>
                 <a:latin typeface="+mj-lt"/>
               </a:rPr>
-              <a:t>  {</a:t>
-            </a:r>
-            <a:r>
-              <a:rPr lang="en-US" sz="5400" dirty="0" smtClean="0">
-                <a:solidFill>
-                  <a:schemeClr val="accent1">
-                    <a:lumMod val="50000"/>
-                  </a:schemeClr>
-                </a:solidFill>
-                <a:latin typeface="+mj-lt"/>
-              </a:rPr>
-              <a:t>m</a:t>
+              <a:t>  {m</a:t>
             </a:r>
             <a:r>
               <a:rPr lang="en-US" sz="5400" b="1" dirty="0" smtClean="0">
@@ -8255,20 +8170,7 @@
                 <a:cs typeface="Comic Sans MS"/>
                 <a:sym typeface="Euclid Symbol" pitchFamily="18" charset="2"/>
               </a:rPr>
-              <a:t>[1,n</a:t>
-            </a:r>
-            <a:r>
-              <a:rPr lang="en-US" sz="5400" dirty="0" smtClean="0">
-                <a:solidFill>
-                  <a:schemeClr val="accent1">
-                    <a:lumMod val="50000"/>
-                  </a:schemeClr>
-                </a:solidFill>
-                <a:latin typeface="Comic Sans MS"/>
-                <a:cs typeface="Comic Sans MS"/>
-                <a:sym typeface="Euclid Symbol" pitchFamily="18" charset="2"/>
-              </a:rPr>
-              <a:t>)</a:t>
+              <a:t>[1,n)</a:t>
             </a:r>
             <a:r>
               <a:rPr lang="en-US" sz="5400" dirty="0" smtClean="0">
@@ -8406,19 +8308,7 @@
                 <a:latin typeface="+mj-lt"/>
                 <a:sym typeface="Euclid Symbol"/>
               </a:rPr>
-              <a:t> </a:t>
-            </a:r>
-            <a:r>
-              <a:rPr lang="en-US" sz="4800" dirty="0" smtClean="0">
-                <a:solidFill>
-                  <a:schemeClr val="accent1">
-                    <a:lumMod val="50000"/>
-                  </a:schemeClr>
-                </a:solidFill>
-                <a:latin typeface="+mj-lt"/>
-                <a:sym typeface="Euclid Symbol"/>
-              </a:rPr>
-              <a:t>n* </a:t>
+              <a:t> n* </a:t>
             </a:r>
             <a:r>
               <a:rPr lang="en-US" sz="4800" dirty="0" smtClean="0">
@@ -8869,7 +8759,7 @@
                                     </p:set>
                                     <p:animEffect transition="in" filter="fade">
                                       <p:cBhvr>
-                                        <p:cTn id="21" dur="1000"/>
+                                        <p:cTn id="21" dur="500"/>
                                         <p:tgtEl>
                                           <p:spTgt spid="5"/>
                                         </p:tgtEl>
@@ -9008,7 +8898,7 @@
         <p:spPr>
           <a:xfrm>
             <a:off x="156368" y="1219200"/>
-            <a:ext cx="8987632" cy="4662815"/>
+            <a:ext cx="8987632" cy="5424562"/>
           </a:xfrm>
           <a:prstGeom prst="rect">
             <a:avLst/>
@@ -9090,20 +8980,7 @@
                 <a:cs typeface="Comic Sans MS"/>
                 <a:sym typeface="Euclid Symbol" pitchFamily="18" charset="2"/>
               </a:rPr>
-              <a:t>[1,n</a:t>
-            </a:r>
-            <a:r>
-              <a:rPr lang="en-US" sz="5400" dirty="0" smtClean="0">
-                <a:solidFill>
-                  <a:schemeClr val="accent1">
-                    <a:lumMod val="50000"/>
-                  </a:schemeClr>
-                </a:solidFill>
-                <a:latin typeface="Comic Sans MS"/>
-                <a:cs typeface="Comic Sans MS"/>
-                <a:sym typeface="Euclid Symbol" pitchFamily="18" charset="2"/>
-              </a:rPr>
-              <a:t>)</a:t>
+              <a:t>[1,n)</a:t>
             </a:r>
             <a:r>
               <a:rPr lang="en-US" sz="5400" dirty="0" smtClean="0">
@@ -9192,6 +9069,32 @@
                 <a:latin typeface="+mj-lt"/>
               </a:rPr>
               <a:t>}</a:t>
+            </a:r>
+            <a:endParaRPr lang="en-US" sz="5400" dirty="0" smtClean="0">
+              <a:solidFill>
+                <a:srgbClr val="000000"/>
+              </a:solidFill>
+              <a:latin typeface="+mj-lt"/>
+            </a:endParaRPr>
+          </a:p>
+          <a:p>
+            <a:pPr lvl="0">
+              <a:lnSpc>
+                <a:spcPct val="150000"/>
+              </a:lnSpc>
+              <a:spcAft>
+                <a:spcPts val="0"/>
+              </a:spcAft>
+              <a:defRPr/>
+            </a:pPr>
+            <a:r>
+              <a:rPr lang="en-US" sz="4800" i="1" dirty="0" smtClean="0">
+                <a:solidFill>
+                  <a:srgbClr val="000000"/>
+                </a:solidFill>
+                <a:latin typeface="Comic Sans MS"/>
+              </a:rPr>
+              <a:t>lemma:</a:t>
             </a:r>
           </a:p>
           <a:p>
@@ -9202,16 +9105,16 @@
               <a:defRPr/>
             </a:pPr>
             <a:r>
-              <a:rPr lang="en-US" sz="4800" i="1" dirty="0" smtClean="0">
+              <a:rPr lang="en-US" sz="5400" dirty="0" err="1" smtClean="0">
                 <a:solidFill>
                   <a:srgbClr val="000000"/>
                 </a:solidFill>
                 <a:latin typeface="Comic Sans MS"/>
               </a:rPr>
-              <a:t>Lemma:</a:t>
-            </a:r>
-            <a:r>
-              <a:rPr lang="en-US" sz="4800" dirty="0" smtClean="0">
+              <a:t>mult</a:t>
+            </a:r>
+            <a:r>
+              <a:rPr lang="en-US" sz="5400" dirty="0" smtClean="0">
                 <a:solidFill>
                   <a:srgbClr val="000000"/>
                 </a:solidFill>
@@ -9222,31 +9125,11 @@
             <a:r>
               <a:rPr lang="en-US" sz="5400" dirty="0" smtClean="0">
                 <a:solidFill>
-                  <a:srgbClr val="CCCCFF">
-                    <a:lumMod val="50000"/>
-                  </a:srgbClr>
+                  <a:srgbClr val="000000"/>
                 </a:solidFill>
                 <a:latin typeface="Comic Sans MS"/>
               </a:rPr>
-              <a:t> </a:t>
-            </a:r>
-            <a:r>
-              <a:rPr lang="en-US" sz="5400" dirty="0" err="1" smtClean="0">
-                <a:solidFill>
-                  <a:srgbClr val="000000"/>
-                </a:solidFill>
-                <a:latin typeface="Comic Sans MS"/>
-              </a:rPr>
-              <a:t>mult</a:t>
-            </a:r>
-            <a:r>
-              <a:rPr lang="en-US" sz="5400" dirty="0" smtClean="0">
-                <a:solidFill>
-                  <a:srgbClr val="000000"/>
-                </a:solidFill>
-                <a:latin typeface="Comic Sans MS"/>
-              </a:rPr>
-              <a:t> by</a:t>
+              <a:t>by</a:t>
             </a:r>
             <a:r>
               <a:rPr lang="en-US" sz="5400" dirty="0" smtClean="0">
@@ -9314,70 +9197,54 @@
               </a:rPr>
               <a:t>,</a:t>
             </a:r>
+            <a:r>
+              <a:rPr lang="en-US" sz="5400" dirty="0" smtClean="0">
+                <a:solidFill>
+                  <a:srgbClr val="CCCCFF">
+                    <a:lumMod val="50000"/>
+                  </a:srgbClr>
+                </a:solidFill>
+                <a:latin typeface="Comic Sans MS"/>
+              </a:rPr>
+              <a:t> </a:t>
+            </a:r>
+            <a:r>
+              <a:rPr lang="en-US" sz="5400" dirty="0" smtClean="0">
+                <a:solidFill>
+                  <a:srgbClr val="000000"/>
+                </a:solidFill>
+                <a:latin typeface="Comic Sans MS"/>
+              </a:rPr>
+              <a:t>permutes </a:t>
+            </a:r>
+            <a:r>
+              <a:rPr lang="en-US" sz="5400" dirty="0" err="1" smtClean="0">
+                <a:solidFill>
+                  <a:srgbClr val="CCCCFF">
+                    <a:lumMod val="50000"/>
+                  </a:srgbClr>
+                </a:solidFill>
+                <a:latin typeface="Comic Sans MS"/>
+              </a:rPr>
+              <a:t>n</a:t>
+            </a:r>
+            <a:r>
+              <a:rPr lang="en-US" sz="5400" dirty="0" smtClean="0">
+                <a:solidFill>
+                  <a:srgbClr val="CCCCFF">
+                    <a:lumMod val="50000"/>
+                  </a:srgbClr>
+                </a:solidFill>
+                <a:latin typeface="Comic Sans MS"/>
+              </a:rPr>
+              <a:t>*</a:t>
+            </a:r>
             <a:endParaRPr lang="en-US" sz="5400" dirty="0" smtClean="0">
               <a:solidFill>
-                <a:srgbClr val="CCCCFF">
-                  <a:lumMod val="50000"/>
-                </a:srgbClr>
+                <a:srgbClr val="000000"/>
               </a:solidFill>
               <a:latin typeface="Comic Sans MS"/>
             </a:endParaRPr>
-          </a:p>
-          <a:p>
-            <a:pPr lvl="0">
-              <a:defRPr/>
-            </a:pPr>
-            <a:r>
-              <a:rPr lang="en-US" sz="5400" dirty="0" smtClean="0">
-                <a:solidFill>
-                  <a:srgbClr val="CCCCFF">
-                    <a:lumMod val="50000"/>
-                  </a:srgbClr>
-                </a:solidFill>
-                <a:latin typeface="Comic Sans MS"/>
-              </a:rPr>
-              <a:t>   </a:t>
-            </a:r>
-            <a:r>
-              <a:rPr lang="en-US" sz="5400" dirty="0" smtClean="0">
-                <a:solidFill>
-                  <a:srgbClr val="000000"/>
-                </a:solidFill>
-                <a:latin typeface="Comic Sans MS"/>
-              </a:rPr>
-              <a:t>permutes </a:t>
-            </a:r>
-            <a:r>
-              <a:rPr lang="en-US" sz="5400" dirty="0" err="1" smtClean="0">
-                <a:solidFill>
-                  <a:srgbClr val="CCCCFF">
-                    <a:lumMod val="50000"/>
-                  </a:srgbClr>
-                </a:solidFill>
-                <a:latin typeface="Comic Sans MS"/>
-              </a:rPr>
-              <a:t>n</a:t>
-            </a:r>
-            <a:r>
-              <a:rPr lang="en-US" sz="5400" dirty="0" smtClean="0">
-                <a:solidFill>
-                  <a:srgbClr val="CCCCFF">
-                    <a:lumMod val="50000"/>
-                  </a:srgbClr>
-                </a:solidFill>
-                <a:latin typeface="Comic Sans MS"/>
-              </a:rPr>
-              <a:t>*</a:t>
-            </a:r>
-            <a:r>
-              <a:rPr lang="en-US" sz="5400" dirty="0" smtClean="0">
-                <a:solidFill>
-                  <a:srgbClr val="000000"/>
-                </a:solidFill>
-                <a:latin typeface="Comic Sans MS"/>
-              </a:rPr>
-              <a:t>.</a:t>
-            </a:r>
           </a:p>
           <a:p>
             <a:pPr>
@@ -9392,12 +9259,75 @@
           </a:p>
         </p:txBody>
       </p:sp>
+      <p:sp>
+        <p:nvSpPr>
+          <p:cNvPr id="6" name="Rectangle 5"/>
+          <p:cNvSpPr/>
+          <p:nvPr/>
+        </p:nvSpPr>
+        <p:spPr bwMode="auto">
+          <a:xfrm>
+            <a:off x="76200" y="4267200"/>
+            <a:ext cx="8915400" cy="1219200"/>
+          </a:xfrm>
+          <a:prstGeom prst="rect">
+            <a:avLst/>
+          </a:prstGeom>
+          <a:noFill/>
+          <a:ln w="50800" cap="flat" cmpd="sng" algn="ctr">
+            <a:solidFill>
+              <a:srgbClr val="FF00FF"/>
+            </a:solidFill>
+            <a:prstDash val="sysDash"/>
+            <a:round/>
+            <a:headEnd type="none" w="med" len="med"/>
+            <a:tailEnd type="arrow" w="lg" len="lg"/>
+          </a:ln>
+          <a:effectLst/>
+        </p:spPr>
+        <p:txBody>
+          <a:bodyPr vert="horz" wrap="square" lIns="91440" tIns="45720" rIns="91440" bIns="45720" numCol="1" rtlCol="0" anchor="t" anchorCtr="0" compatLnSpc="1">
+            <a:prstTxWarp prst="textNoShape">
+              <a:avLst/>
+            </a:prstTxWarp>
+          </a:bodyPr>
+          <a:lstStyle/>
+          <a:p>
+            <a:pPr marL="0" marR="0" indent="0" algn="l" defTabSz="914400" rtl="0" eaLnBrk="1" fontAlgn="base" latinLnBrk="0" hangingPunct="1">
+              <a:lnSpc>
+                <a:spcPct val="100000"/>
+              </a:lnSpc>
+              <a:spcBef>
+                <a:spcPct val="0"/>
+              </a:spcBef>
+              <a:spcAft>
+                <a:spcPct val="0"/>
+              </a:spcAft>
+              <a:buClrTx/>
+              <a:buSzTx/>
+              <a:buFontTx/>
+              <a:buNone/>
+              <a:tabLst/>
+            </a:pPr>
+            <a:endParaRPr kumimoji="0" lang="en-US" sz="3600" b="0" i="0" u="none" strike="noStrike" cap="none" normalizeH="0" baseline="0" smtClean="0">
+              <a:ln>
+                <a:noFill/>
+              </a:ln>
+              <a:solidFill>
+                <a:schemeClr val="tx1"/>
+              </a:solidFill>
+              <a:effectLst/>
+              <a:latin typeface="Times New Roman" pitchFamily="18" charset="0"/>
+            </a:endParaRPr>
+          </a:p>
+        </p:txBody>
+      </p:sp>
     </p:spTree>
   </p:cSld>
   <p:clrMapOvr>
     <a:masterClrMapping/>
   </p:clrMapOvr>
-  <p:transition spd="med">
+  <p:transition spd="slow">
     <p:fade/>
   </p:transition>
   <p:timing>
@@ -9412,6 +9342,9 @@
                     <p:cTn id="3" fill="hold">
                       <p:stCondLst>
                         <p:cond delay="indefinite"/>
+                        <p:cond evt="onBegin" delay="0">
+                          <p:tn val="2"/>
+                        </p:cond>
                       </p:stCondLst>
                       <p:childTnLst>
                         <p:par>
@@ -9421,7 +9354,7 @@
                             </p:stCondLst>
                             <p:childTnLst>
                               <p:par>
-                                <p:cTn id="5" presetID="22" presetClass="entr" presetSubtype="8" fill="hold" nodeType="clickEffect">
+                                <p:cTn id="5" presetID="10" presetClass="entr" presetSubtype="0" fill="hold" grpId="0" nodeType="afterEffect">
                                   <p:stCondLst>
                                     <p:cond delay="0"/>
                                   </p:stCondLst>
@@ -9434,11 +9367,7 @@
                                           </p:stCondLst>
                                         </p:cTn>
                                         <p:tgtEl>
-                                          <p:spTgt spid="8">
-                                            <p:txEl>
-                                              <p:pRg st="3" end="3"/>
-                                            </p:txEl>
-                                          </p:spTgt>
+                                          <p:spTgt spid="6"/>
                                         </p:tgtEl>
                                         <p:attrNameLst>
                                           <p:attrName>style.visibility</p:attrName>
@@ -9448,15 +9377,11 @@
                                         <p:strVal val="visible"/>
                                       </p:to>
                                     </p:set>
-                                    <p:animEffect transition="in" filter="wipe(left)">
+                                    <p:animEffect transition="in" filter="fade">
                                       <p:cBhvr>
                                         <p:cTn id="7" dur="500"/>
                                         <p:tgtEl>
-                                          <p:spTgt spid="8">
-                                            <p:txEl>
-                                              <p:pRg st="3" end="3"/>
-                                            </p:txEl>
-                                          </p:spTgt>
+                                          <p:spTgt spid="6"/>
                                         </p:tgtEl>
                                       </p:cBhvr>
                                     </p:animEffect>
@@ -9490,6 +9415,9 @@
         </p:cTn>
       </p:par>
     </p:tnLst>
+    <p:bldLst>
+      <p:bldP spid="6" grpId="0" animBg="1"/>
+    </p:bldLst>
   </p:timing>
 </p:sld>
 </file>
@@ -12859,11 +12787,53 @@
           </a:p>
         </p:txBody>
       </p:sp>
+      <p:sp useBgFill="1">
+        <p:nvSpPr>
+          <p:cNvPr id="8" name="TextBox 7"/>
+          <p:cNvSpPr txBox="1"/>
+          <p:nvPr/>
+        </p:nvSpPr>
+        <p:spPr>
+          <a:xfrm>
+            <a:off x="3276600" y="2362200"/>
+            <a:ext cx="3810000" cy="1200329"/>
+          </a:xfrm>
+          <a:prstGeom prst="rect">
+            <a:avLst/>
+          </a:prstGeom>
+        </p:spPr>
+        <p:txBody>
+          <a:bodyPr wrap="square" rtlCol="0">
+            <a:spAutoFit/>
+          </a:bodyPr>
+          <a:lstStyle/>
+          <a:p>
+            <a:r>
+              <a:rPr lang="en-US" sz="7200" dirty="0" smtClean="0">
+                <a:solidFill>
+                  <a:srgbClr val="0000FF"/>
+                </a:solidFill>
+                <a:latin typeface="+mj-lt"/>
+              </a:rPr>
+              <a:t>  [0,n)     </a:t>
+            </a:r>
+            <a:endParaRPr lang="en-US" sz="7200" dirty="0" smtClean="0">
+              <a:solidFill>
+                <a:srgbClr val="0000FF"/>
+              </a:solidFill>
+              <a:latin typeface="+mj-lt"/>
+            </a:endParaRPr>
+          </a:p>
+        </p:txBody>
+      </p:sp>
     </p:spTree>
   </p:cSld>
   <p:clrMapOvr>
     <a:masterClrMapping/>
   </p:clrMapOvr>
+  <p:transition spd="slow">
+    <p:fade/>
+  </p:transition>
   <p:timing>
     <p:tnLst>
       <p:par>
@@ -13050,7 +13020,7 @@
                             </p:stCondLst>
                             <p:childTnLst>
                               <p:par>
-                                <p:cTn id="18" presetID="9" presetClass="entr" presetSubtype="0" fill="hold" grpId="0" nodeType="clickEffect">
+                                <p:cTn id="18" presetID="10" presetClass="entr" presetSubtype="0" fill="hold" grpId="0" nodeType="clickEffect">
                                   <p:stCondLst>
                                     <p:cond delay="0"/>
                                   </p:stCondLst>
@@ -13058,6 +13028,59 @@
                                     <p:set>
                                       <p:cBhvr>
                                         <p:cTn id="19" dur="1" fill="hold">
+                                          <p:stCondLst>
+                                            <p:cond delay="0"/>
+                                          </p:stCondLst>
+                                        </p:cTn>
+                                        <p:tgtEl>
+                                          <p:spTgt spid="8"/>
+                                        </p:tgtEl>
+                                        <p:attrNameLst>
+                                          <p:attrName>style.visibility</p:attrName>
+                                        </p:attrNameLst>
+                                      </p:cBhvr>
+                                      <p:to>
+                                        <p:strVal val="visible"/>
+                                      </p:to>
+                                    </p:set>
+                                    <p:animEffect transition="in" filter="fade">
+                                      <p:cBhvr>
+                                        <p:cTn id="20" dur="1000"/>
+                                        <p:tgtEl>
+                                          <p:spTgt spid="8"/>
+                                        </p:tgtEl>
+                                      </p:cBhvr>
+                                    </p:animEffect>
+                                  </p:childTnLst>
+                                </p:cTn>
+                              </p:par>
+                            </p:childTnLst>
+                          </p:cTn>
+                        </p:par>
+                      </p:childTnLst>
+                    </p:cTn>
+                  </p:par>
+                  <p:par>
+                    <p:cTn id="21" fill="hold">
+                      <p:stCondLst>
+                        <p:cond delay="indefinite"/>
+                      </p:stCondLst>
+                      <p:childTnLst>
+                        <p:par>
+                          <p:cTn id="22" fill="hold">
+                            <p:stCondLst>
+                              <p:cond delay="0"/>
+                            </p:stCondLst>
+                            <p:childTnLst>
+                              <p:par>
+                                <p:cTn id="23" presetID="9" presetClass="entr" presetSubtype="0" fill="hold" grpId="0" nodeType="clickEffect">
+                                  <p:stCondLst>
+                                    <p:cond delay="0"/>
+                                  </p:stCondLst>
+                                  <p:childTnLst>
+                                    <p:set>
+                                      <p:cBhvr>
+                                        <p:cTn id="24" dur="1" fill="hold">
                                           <p:stCondLst>
                                             <p:cond delay="0"/>
                                           </p:stCondLst>
@@ -13075,7 +13098,7 @@
                                     </p:set>
                                     <p:animEffect transition="in" filter="dissolve">
                                       <p:cBhvr>
-                                        <p:cTn id="20" dur="500"/>
+                                        <p:cTn id="25" dur="500"/>
                                         <p:tgtEl>
                                           <p:spTgt spid="7"/>
                                         </p:tgtEl>
@@ -13114,6 +13137,7 @@
     <p:bldLst>
       <p:bldP spid="372739" grpId="0" build="p"/>
       <p:bldP spid="7" grpId="0" animBg="1"/>
+      <p:bldP spid="8" grpId="0" animBg="1"/>
     </p:bldLst>
   </p:timing>
 </p:sld>
@@ -14078,10 +14102,10 @@
                 <a:latin typeface="Comic Sans MS"/>
                 <a:cs typeface="Comic Sans MS"/>
               </a:rPr>
-              <a:t> </a:t>
-            </a:r>
-            <a:r>
-              <a:rPr lang="en-US" sz="4800" dirty="0" smtClean="0">
+              <a:t> (mod </a:t>
+            </a:r>
+            <a:r>
+              <a:rPr lang="en-US" sz="4800" dirty="0" err="1" smtClean="0">
                 <a:solidFill>
                   <a:schemeClr val="accent1">
                     <a:lumMod val="50000"/>
@@ -14090,10 +14114,10 @@
                 <a:latin typeface="Comic Sans MS"/>
                 <a:cs typeface="Comic Sans MS"/>
               </a:rPr>
-              <a:t>(mod </a:t>
-            </a:r>
-            <a:r>
-              <a:rPr lang="en-US" sz="4800" dirty="0" err="1" smtClean="0">
+              <a:t>n</a:t>
+            </a:r>
+            <a:r>
+              <a:rPr lang="en-US" sz="4800" dirty="0" smtClean="0">
                 <a:solidFill>
                   <a:schemeClr val="accent1">
                     <a:lumMod val="50000"/>
@@ -14102,32 +14126,32 @@
                 <a:latin typeface="Comic Sans MS"/>
                 <a:cs typeface="Comic Sans MS"/>
               </a:rPr>
-              <a:t>n</a:t>
+              <a:t>) </a:t>
             </a:r>
             <a:r>
               <a:rPr lang="en-US" sz="4800" dirty="0" smtClean="0">
                 <a:solidFill>
-                  <a:schemeClr val="accent1">
-                    <a:lumMod val="50000"/>
-                  </a:schemeClr>
+                  <a:srgbClr val="000000"/>
                 </a:solidFill>
                 <a:latin typeface="Comic Sans MS"/>
                 <a:cs typeface="Comic Sans MS"/>
               </a:rPr>
-              <a:t>) </a:t>
+              <a:t>because</a:t>
             </a:r>
             <a:r>
               <a:rPr lang="en-US" sz="4800" dirty="0" smtClean="0">
                 <a:solidFill>
-                  <a:srgbClr val="000000"/>
+                  <a:schemeClr val="accent1">
+                    <a:lumMod val="50000"/>
+                  </a:schemeClr>
                 </a:solidFill>
                 <a:latin typeface="Comic Sans MS"/>
                 <a:cs typeface="Comic Sans MS"/>
               </a:rPr>
-              <a:t>because</a:t>
-            </a:r>
-            <a:r>
-              <a:rPr lang="en-US" sz="4800" dirty="0" smtClean="0">
+              <a:t> </a:t>
+            </a:r>
+            <a:r>
+              <a:rPr lang="en-US" sz="4800" dirty="0" err="1" smtClean="0">
                 <a:solidFill>
                   <a:schemeClr val="accent1">
                     <a:lumMod val="50000"/>
@@ -14136,10 +14160,10 @@
                 <a:latin typeface="Comic Sans MS"/>
                 <a:cs typeface="Comic Sans MS"/>
               </a:rPr>
-              <a:t> </a:t>
-            </a:r>
-            <a:r>
-              <a:rPr lang="en-US" sz="4800" dirty="0" err="1" smtClean="0">
+              <a:t>k</a:t>
+            </a:r>
+            <a:r>
+              <a:rPr lang="en-US" sz="4800" dirty="0" smtClean="0">
                 <a:solidFill>
                   <a:schemeClr val="accent1">
                     <a:lumMod val="50000"/>
@@ -14148,51 +14172,30 @@
                 <a:latin typeface="Comic Sans MS"/>
                 <a:cs typeface="Comic Sans MS"/>
               </a:rPr>
-              <a:t>k</a:t>
+              <a:t> </a:t>
             </a:r>
             <a:r>
               <a:rPr lang="en-US" sz="4800" dirty="0" smtClean="0">
                 <a:solidFill>
-                  <a:schemeClr val="accent1">
-                    <a:lumMod val="50000"/>
-                  </a:schemeClr>
+                  <a:srgbClr val="000000"/>
                 </a:solidFill>
                 <a:latin typeface="Comic Sans MS"/>
                 <a:cs typeface="Comic Sans MS"/>
               </a:rPr>
-              <a:t> </a:t>
+              <a:t>cancels</a:t>
             </a:r>
             <a:r>
               <a:rPr lang="en-US" sz="4800" dirty="0" smtClean="0">
                 <a:solidFill>
-                  <a:srgbClr val="000000"/>
+                  <a:schemeClr val="accent1">
+                    <a:lumMod val="50000"/>
+                  </a:schemeClr>
                 </a:solidFill>
                 <a:latin typeface="Comic Sans MS"/>
                 <a:cs typeface="Comic Sans MS"/>
               </a:rPr>
-              <a:t>cancels</a:t>
-            </a:r>
-            <a:r>
-              <a:rPr lang="en-US" sz="4800" dirty="0" smtClean="0">
-                <a:solidFill>
-                  <a:schemeClr val="accent1">
-                    <a:lumMod val="50000"/>
-                  </a:schemeClr>
-                </a:solidFill>
-                <a:latin typeface="Comic Sans MS"/>
-                <a:cs typeface="Comic Sans MS"/>
-              </a:rPr>
               <a:t> </a:t>
             </a:r>
-            <a:endParaRPr lang="en-US" sz="4800" dirty="0" smtClean="0">
-              <a:solidFill>
-                <a:schemeClr val="accent1">
-                  <a:lumMod val="50000"/>
-                </a:schemeClr>
-              </a:solidFill>
-              <a:latin typeface="Comic Sans MS"/>
-              <a:cs typeface="Comic Sans MS"/>
-            </a:endParaRPr>
           </a:p>
           <a:p>
             <a:pPr>
@@ -14211,7 +14214,40 @@
                 <a:cs typeface="Comic Sans MS"/>
                 <a:sym typeface="Euclid Symbol" pitchFamily="18" charset="2"/>
               </a:rPr>
-              <a:t> </a:t>
+              <a:t> each </a:t>
+            </a:r>
+            <a:r>
+              <a:rPr lang="en-US" sz="4800" dirty="0" err="1" smtClean="0">
+                <a:solidFill>
+                  <a:schemeClr val="accent1">
+                    <a:lumMod val="50000"/>
+                  </a:schemeClr>
+                </a:solidFill>
+                <a:latin typeface="Comic Sans MS" pitchFamily="66" charset="0"/>
+              </a:rPr>
+              <a:t>m</a:t>
+            </a:r>
+            <a:r>
+              <a:rPr lang="en-US" sz="4800" baseline="-25000" dirty="0" err="1" smtClean="0">
+                <a:solidFill>
+                  <a:schemeClr val="accent1">
+                    <a:lumMod val="50000"/>
+                  </a:schemeClr>
+                </a:solidFill>
+                <a:latin typeface="Comic Sans MS" pitchFamily="66" charset="0"/>
+              </a:rPr>
+              <a:t>i</a:t>
+            </a:r>
+            <a:r>
+              <a:rPr lang="en-US" sz="4800" dirty="0" err="1" smtClean="0">
+                <a:solidFill>
+                  <a:schemeClr val="accent1">
+                    <a:lumMod val="50000"/>
+                  </a:schemeClr>
+                </a:solidFill>
+                <a:latin typeface="Comic Sans MS" pitchFamily="66" charset="0"/>
+              </a:rPr>
+              <a:t>k</a:t>
             </a:r>
             <a:r>
               <a:rPr lang="en-US" sz="4800" dirty="0" smtClean="0">
@@ -14219,47 +14255,6 @@
                 <a:cs typeface="Comic Sans MS"/>
                 <a:sym typeface="Euclid Symbol" pitchFamily="18" charset="2"/>
               </a:rPr>
-              <a:t>each </a:t>
-            </a:r>
-            <a:r>
-              <a:rPr lang="en-US" sz="4800" dirty="0" err="1" smtClean="0">
-                <a:solidFill>
-                  <a:schemeClr val="accent1">
-                    <a:lumMod val="50000"/>
-                  </a:schemeClr>
-                </a:solidFill>
-                <a:latin typeface="Comic Sans MS" pitchFamily="66" charset="0"/>
-              </a:rPr>
-              <a:t>m</a:t>
-            </a:r>
-            <a:r>
-              <a:rPr lang="en-US" sz="4800" baseline="-25000" dirty="0" err="1" smtClean="0">
-                <a:solidFill>
-                  <a:schemeClr val="accent1">
-                    <a:lumMod val="50000"/>
-                  </a:schemeClr>
-                </a:solidFill>
-                <a:latin typeface="Comic Sans MS" pitchFamily="66" charset="0"/>
-              </a:rPr>
-              <a:t>i</a:t>
-            </a:r>
-            <a:r>
-              <a:rPr lang="en-US" sz="4800" dirty="0" err="1" smtClean="0">
-                <a:solidFill>
-                  <a:schemeClr val="accent1">
-                    <a:lumMod val="50000"/>
-                  </a:schemeClr>
-                </a:solidFill>
-                <a:latin typeface="Comic Sans MS" pitchFamily="66" charset="0"/>
-              </a:rPr>
-              <a:t>k</a:t>
-            </a:r>
-            <a:r>
-              <a:rPr lang="en-US" sz="4800" dirty="0" smtClean="0">
-                <a:latin typeface="Comic Sans MS"/>
-                <a:cs typeface="Comic Sans MS"/>
-                <a:sym typeface="Euclid Symbol" pitchFamily="18" charset="2"/>
-              </a:rPr>
               <a:t> </a:t>
             </a:r>
             <a:r>
@@ -14330,19 +14325,7 @@
                 <a:latin typeface="Comic Sans MS"/>
                 <a:cs typeface="Comic Sans MS"/>
               </a:rPr>
-              <a:t>(</a:t>
-            </a:r>
-            <a:r>
-              <a:rPr lang="en-US" sz="4800" dirty="0" smtClean="0">
-                <a:solidFill>
-                  <a:schemeClr val="accent1">
-                    <a:lumMod val="50000"/>
-                  </a:schemeClr>
-                </a:solidFill>
-                <a:latin typeface="Comic Sans MS"/>
-                <a:cs typeface="Comic Sans MS"/>
-              </a:rPr>
-              <a:t>mod </a:t>
+              <a:t>(mod </a:t>
             </a:r>
             <a:r>
               <a:rPr lang="en-US" sz="4800" dirty="0" err="1" smtClean="0">
@@ -15162,19 +15145,7 @@
                 <a:latin typeface="Comic Sans MS"/>
                 <a:cs typeface="Comic Sans MS"/>
               </a:rPr>
-              <a:t>∙∙∙</a:t>
-            </a:r>
-            <a:r>
-              <a:rPr lang="en-US" sz="4800" dirty="0" smtClean="0">
-                <a:solidFill>
-                  <a:schemeClr val="accent1">
-                    <a:lumMod val="50000"/>
-                  </a:schemeClr>
-                </a:solidFill>
-                <a:latin typeface="Comic Sans MS"/>
-                <a:cs typeface="Comic Sans MS"/>
-              </a:rPr>
-              <a:t> </a:t>
+              <a:t>∙∙∙ </a:t>
             </a:r>
             <a:r>
               <a:rPr lang="en-US" sz="4800" b="1" dirty="0" smtClean="0">
@@ -15283,7 +15254,17 @@
                 </a:solidFill>
                 <a:latin typeface="Comic Sans MS" pitchFamily="66" charset="0"/>
               </a:rPr>
-              <a:t>k</a:t>
+              <a:t>k)</a:t>
+            </a:r>
+            <a:r>
+              <a:rPr lang="en-US" sz="4800" b="1" dirty="0" smtClean="0">
+                <a:solidFill>
+                  <a:srgbClr val="0000E5"/>
+                </a:solidFill>
+                <a:latin typeface="Comic Sans MS" pitchFamily="66" charset="0"/>
+                <a:sym typeface="Euclid Symbol" pitchFamily="18" charset="2"/>
+              </a:rPr>
+              <a:t>⋅</a:t>
             </a:r>
             <a:r>
               <a:rPr lang="en-US" sz="4800" dirty="0" smtClean="0">
@@ -15294,17 +15275,18 @@
                 </a:solidFill>
                 <a:latin typeface="Comic Sans MS" pitchFamily="66" charset="0"/>
               </a:rPr>
-              <a:t>)</a:t>
-            </a:r>
-            <a:r>
-              <a:rPr lang="en-US" sz="4800" b="1" dirty="0" smtClean="0">
-                <a:solidFill>
-                  <a:srgbClr val="0000E5"/>
-                </a:solidFill>
-                <a:latin typeface="Comic Sans MS" pitchFamily="66" charset="0"/>
-                <a:sym typeface="Euclid Symbol" pitchFamily="18" charset="2"/>
-              </a:rPr>
-              <a:t>⋅</a:t>
+              <a:t>(m</a:t>
+            </a:r>
+            <a:r>
+              <a:rPr lang="en-US" sz="4800" baseline="-25000" dirty="0" smtClean="0">
+                <a:solidFill>
+                  <a:schemeClr val="accent1">
+                    <a:lumMod val="50000"/>
+                  </a:schemeClr>
+                </a:solidFill>
+                <a:latin typeface="Comic Sans MS" pitchFamily="66" charset="0"/>
+              </a:rPr>
+              <a:t>2</a:t>
             </a:r>
             <a:r>
               <a:rPr lang="en-US" sz="4800" dirty="0" smtClean="0">
@@ -15315,7 +15297,7 @@
                 </a:solidFill>
                 <a:latin typeface="Comic Sans MS" pitchFamily="66" charset="0"/>
               </a:rPr>
-              <a:t>(</a:t>
+              <a:t>k)</a:t>
             </a:r>
             <a:r>
               <a:rPr lang="en-US" sz="4800" dirty="0" smtClean="0">
@@ -15324,6 +15306,16 @@
                     <a:lumMod val="50000"/>
                   </a:schemeClr>
                 </a:solidFill>
+              </a:rPr>
+              <a:t>∙∙∙(</a:t>
+            </a:r>
+            <a:r>
+              <a:rPr lang="en-US" sz="4800" dirty="0" smtClean="0">
+                <a:solidFill>
+                  <a:schemeClr val="accent1">
+                    <a:lumMod val="50000"/>
+                  </a:schemeClr>
+                </a:solidFill>
                 <a:latin typeface="Comic Sans MS" pitchFamily="66" charset="0"/>
               </a:rPr>
               <a:t>m</a:t>
@@ -15337,7 +15329,7 @@
                 </a:solidFill>
                 <a:latin typeface="Comic Sans MS" pitchFamily="66" charset="0"/>
               </a:rPr>
-              <a:t>2</a:t>
+              <a:t>s</a:t>
             </a:r>
             <a:r>
               <a:rPr lang="en-US" sz="4800" dirty="0" smtClean="0">
@@ -15348,92 +15340,7 @@
                 </a:solidFill>
                 <a:latin typeface="Comic Sans MS" pitchFamily="66" charset="0"/>
               </a:rPr>
-              <a:t>k</a:t>
-            </a:r>
-            <a:r>
-              <a:rPr lang="en-US" sz="4800" dirty="0" smtClean="0">
-                <a:solidFill>
-                  <a:schemeClr val="accent1">
-                    <a:lumMod val="50000"/>
-                  </a:schemeClr>
-                </a:solidFill>
-                <a:latin typeface="Comic Sans MS" pitchFamily="66" charset="0"/>
-              </a:rPr>
-              <a:t>)</a:t>
-            </a:r>
-            <a:r>
-              <a:rPr lang="en-US" sz="4800" dirty="0" smtClean="0">
-                <a:solidFill>
-                  <a:schemeClr val="accent1">
-                    <a:lumMod val="50000"/>
-                  </a:schemeClr>
-                </a:solidFill>
-              </a:rPr>
-              <a:t>∙</a:t>
-            </a:r>
-            <a:r>
-              <a:rPr lang="en-US" sz="4800" dirty="0" smtClean="0">
-                <a:solidFill>
-                  <a:schemeClr val="accent1">
-                    <a:lumMod val="50000"/>
-                  </a:schemeClr>
-                </a:solidFill>
-              </a:rPr>
-              <a:t>∙</a:t>
-            </a:r>
-            <a:r>
-              <a:rPr lang="en-US" sz="4800" dirty="0" smtClean="0">
-                <a:solidFill>
-                  <a:schemeClr val="accent1">
-                    <a:lumMod val="50000"/>
-                  </a:schemeClr>
-                </a:solidFill>
-              </a:rPr>
-              <a:t>∙(</a:t>
-            </a:r>
-            <a:r>
-              <a:rPr lang="en-US" sz="4800" dirty="0" smtClean="0">
-                <a:solidFill>
-                  <a:schemeClr val="accent1">
-                    <a:lumMod val="50000"/>
-                  </a:schemeClr>
-                </a:solidFill>
-                <a:latin typeface="Comic Sans MS" pitchFamily="66" charset="0"/>
-              </a:rPr>
-              <a:t>m</a:t>
-            </a:r>
-            <a:r>
-              <a:rPr lang="en-US" sz="4800" baseline="-25000" dirty="0" smtClean="0">
-                <a:solidFill>
-                  <a:schemeClr val="accent1">
-                    <a:lumMod val="50000"/>
-                  </a:schemeClr>
-                </a:solidFill>
-                <a:latin typeface="Comic Sans MS" pitchFamily="66" charset="0"/>
-              </a:rPr>
-              <a:t>s</a:t>
-            </a:r>
-            <a:r>
-              <a:rPr lang="en-US" sz="4800" dirty="0" smtClean="0">
-                <a:solidFill>
-                  <a:schemeClr val="accent1">
-                    <a:lumMod val="50000"/>
-                  </a:schemeClr>
-                </a:solidFill>
-                <a:latin typeface="Comic Sans MS" pitchFamily="66" charset="0"/>
-              </a:rPr>
-              <a:t>k</a:t>
-            </a:r>
-            <a:r>
-              <a:rPr lang="en-US" sz="4800" dirty="0" smtClean="0">
-                <a:solidFill>
-                  <a:schemeClr val="accent1">
-                    <a:lumMod val="50000"/>
-                  </a:schemeClr>
-                </a:solidFill>
-                <a:latin typeface="Comic Sans MS" pitchFamily="66" charset="0"/>
-              </a:rPr>
-              <a:t>)  (mod </a:t>
+              <a:t>k)  (mod </a:t>
             </a:r>
             <a:r>
               <a:rPr lang="en-US" sz="4800" dirty="0" err="1" smtClean="0">
@@ -16191,7 +16098,7 @@
                 <a:latin typeface="Comic Sans MS" pitchFamily="66" charset="0"/>
                 <a:sym typeface="Euclid Symbol" pitchFamily="18" charset="2"/>
               </a:rPr>
-              <a:t> </a:t>
+              <a:t> (  </a:t>
             </a:r>
             <a:r>
               <a:rPr lang="en-US" sz="4800" dirty="0" smtClean="0">
@@ -16201,11 +16108,42 @@
                   </a:schemeClr>
                 </a:solidFill>
                 <a:latin typeface="Comic Sans MS" pitchFamily="66" charset="0"/>
+              </a:rPr>
+              <a:t>k)</a:t>
+            </a:r>
+            <a:r>
+              <a:rPr lang="en-US" sz="4800" b="1" dirty="0" smtClean="0">
+                <a:solidFill>
+                  <a:srgbClr val="0000E5"/>
+                </a:solidFill>
+                <a:latin typeface="Comic Sans MS" pitchFamily="66" charset="0"/>
                 <a:sym typeface="Euclid Symbol" pitchFamily="18" charset="2"/>
               </a:rPr>
+              <a:t>⋅</a:t>
+            </a:r>
+            <a:r>
+              <a:rPr lang="en-US" sz="4800" dirty="0" smtClean="0">
+                <a:solidFill>
+                  <a:schemeClr val="accent1">
+                    <a:lumMod val="50000"/>
+                  </a:schemeClr>
+                </a:solidFill>
+                <a:latin typeface="Comic Sans MS" pitchFamily="66" charset="0"/>
+              </a:rPr>
               <a:t>(  </a:t>
             </a:r>
             <a:r>
+              <a:rPr lang="en-US" sz="4800" dirty="0" err="1" smtClean="0">
+                <a:solidFill>
+                  <a:schemeClr val="accent1">
+                    <a:lumMod val="50000"/>
+                  </a:schemeClr>
+                </a:solidFill>
+                <a:latin typeface="Comic Sans MS" pitchFamily="66" charset="0"/>
+              </a:rPr>
+              <a:t>k</a:t>
+            </a:r>
+            <a:r>
               <a:rPr lang="en-US" sz="4800" dirty="0" smtClean="0">
                 <a:solidFill>
                   <a:schemeClr val="accent1">
@@ -16214,17 +16152,7 @@
                 </a:solidFill>
                 <a:latin typeface="Comic Sans MS" pitchFamily="66" charset="0"/>
               </a:rPr>
-              <a:t>k)</a:t>
-            </a:r>
-            <a:r>
-              <a:rPr lang="en-US" sz="4800" b="1" dirty="0" smtClean="0">
-                <a:solidFill>
-                  <a:srgbClr val="0000E5"/>
-                </a:solidFill>
-                <a:latin typeface="Comic Sans MS" pitchFamily="66" charset="0"/>
-                <a:sym typeface="Euclid Symbol" pitchFamily="18" charset="2"/>
-              </a:rPr>
-              <a:t>⋅</a:t>
+              <a:t>) </a:t>
             </a:r>
             <a:r>
               <a:rPr lang="en-US" sz="4800" dirty="0" smtClean="0">
@@ -16233,61 +16161,8 @@
                     <a:lumMod val="50000"/>
                   </a:schemeClr>
                 </a:solidFill>
-                <a:latin typeface="Comic Sans MS" pitchFamily="66" charset="0"/>
-              </a:rPr>
-              <a:t>(  </a:t>
-            </a:r>
-            <a:r>
-              <a:rPr lang="en-US" sz="4800" dirty="0" err="1" smtClean="0">
-                <a:solidFill>
-                  <a:schemeClr val="accent1">
-                    <a:lumMod val="50000"/>
-                  </a:schemeClr>
-                </a:solidFill>
-                <a:latin typeface="Comic Sans MS" pitchFamily="66" charset="0"/>
-              </a:rPr>
-              <a:t>k</a:t>
-            </a:r>
-            <a:r>
-              <a:rPr lang="en-US" sz="4800" dirty="0" smtClean="0">
-                <a:solidFill>
-                  <a:schemeClr val="accent1">
-                    <a:lumMod val="50000"/>
-                  </a:schemeClr>
-                </a:solidFill>
-                <a:latin typeface="Comic Sans MS" pitchFamily="66" charset="0"/>
-              </a:rPr>
-              <a:t>) </a:t>
-            </a:r>
-            <a:r>
-              <a:rPr lang="en-US" sz="4800" dirty="0" smtClean="0">
-                <a:solidFill>
-                  <a:schemeClr val="accent1">
-                    <a:lumMod val="50000"/>
-                  </a:schemeClr>
-                </a:solidFill>
-              </a:rPr>
-              <a:t>∙</a:t>
-            </a:r>
-            <a:r>
-              <a:rPr lang="en-US" sz="4800" dirty="0" smtClean="0">
-                <a:solidFill>
-                  <a:schemeClr val="accent1">
-                    <a:lumMod val="50000"/>
-                  </a:schemeClr>
-                </a:solidFill>
-              </a:rPr>
-              <a:t>∙</a:t>
-            </a:r>
-            <a:r>
-              <a:rPr lang="en-US" sz="4800" dirty="0" smtClean="0">
-                <a:solidFill>
-                  <a:schemeClr val="accent1">
-                    <a:lumMod val="50000"/>
-                  </a:schemeClr>
-                </a:solidFill>
-              </a:rPr>
-              <a:t>∙ </a:t>
+              </a:rPr>
+              <a:t>∙∙∙ </a:t>
             </a:r>
             <a:r>
               <a:rPr lang="en-US" sz="4800" dirty="0" smtClean="0">
@@ -16332,29 +16207,7 @@
                 </a:solidFill>
                 <a:latin typeface="Comic Sans MS" pitchFamily="66" charset="0"/>
               </a:rPr>
-              <a:t>)</a:t>
-            </a:r>
-            <a:r>
-              <a:rPr lang="en-US" sz="4800" dirty="0" smtClean="0">
-                <a:solidFill>
-                  <a:schemeClr val="accent1">
-                    <a:lumMod val="50000"/>
-                  </a:schemeClr>
-                </a:solidFill>
-                <a:latin typeface="Comic Sans MS" pitchFamily="66" charset="0"/>
-              </a:rPr>
-              <a:t>    (</a:t>
-            </a:r>
-            <a:r>
-              <a:rPr lang="en-US" sz="4800" dirty="0" smtClean="0">
-                <a:solidFill>
-                  <a:schemeClr val="accent1">
-                    <a:lumMod val="50000"/>
-                  </a:schemeClr>
-                </a:solidFill>
-                <a:latin typeface="Comic Sans MS" pitchFamily="66" charset="0"/>
-              </a:rPr>
-              <a:t>mod </a:t>
+              <a:t>)    (mod </a:t>
             </a:r>
             <a:r>
               <a:rPr lang="en-US" sz="4800" dirty="0" err="1" smtClean="0">
@@ -16640,18 +16493,7 @@
                 </a:solidFill>
                 <a:latin typeface="Comic Sans MS" pitchFamily="66" charset="0"/>
               </a:rPr>
-              <a:t>                 (</a:t>
-            </a:r>
-            <a:r>
-              <a:rPr lang="en-US" sz="4800" dirty="0" smtClean="0">
-                <a:solidFill>
-                  <a:schemeClr val="accent1">
-                    <a:lumMod val="50000"/>
-                  </a:schemeClr>
-                </a:solidFill>
-                <a:latin typeface="Comic Sans MS" pitchFamily="66" charset="0"/>
-              </a:rPr>
-              <a:t>mod </a:t>
+              <a:t>                 (mod </a:t>
             </a:r>
             <a:r>
               <a:rPr lang="en-US" sz="4800" dirty="0" err="1" smtClean="0">
@@ -16767,6 +16609,667 @@
 </file>
 
 <file path=ppt/slides/slide25.xml><?xml version="1.0" encoding="utf-8"?>
+<p:sld xmlns:a="http://schemas.openxmlformats.org/drawingml/2006/main" xmlns:r="http://schemas.openxmlformats.org/officeDocument/2006/relationships" xmlns:mc="http://schemas.openxmlformats.org/markup-compatibility/2006" xmlns:mv="urn:schemas-microsoft-com:mac:vml" xmlns:p="http://schemas.openxmlformats.org/presentationml/2006/main" mc:Ignorable="mv" mc:PreserveAttributes="mv:*">
+  <p:cSld>
+    <p:spTree>
+      <p:nvGrpSpPr>
+        <p:cNvPr id="1" name=""/>
+        <p:cNvGrpSpPr/>
+        <p:nvPr/>
+      </p:nvGrpSpPr>
+      <p:grpSpPr>
+        <a:xfrm>
+          <a:off x="0" y="0"/>
+          <a:ext cx="0" cy="0"/>
+          <a:chOff x="0" y="0"/>
+          <a:chExt cx="0" cy="0"/>
+        </a:xfrm>
+      </p:grpSpPr>
+      <p:sp>
+        <p:nvSpPr>
+          <p:cNvPr id="407557" name="Text Box 5"/>
+          <p:cNvSpPr txBox="1">
+            <a:spLocks noChangeArrowheads="1"/>
+          </p:cNvSpPr>
+          <p:nvPr/>
+        </p:nvSpPr>
+        <p:spPr bwMode="auto">
+          <a:xfrm>
+            <a:off x="76200" y="1243548"/>
+            <a:ext cx="8991600" cy="2677656"/>
+          </a:xfrm>
+          <a:prstGeom prst="rect">
+            <a:avLst/>
+          </a:prstGeom>
+          <a:noFill/>
+          <a:ln w="9525">
+            <a:noFill/>
+            <a:miter lim="800000"/>
+            <a:headEnd/>
+            <a:tailEnd type="none" w="lg" len="lg"/>
+          </a:ln>
+          <a:effectLst/>
+        </p:spPr>
+        <p:txBody>
+          <a:bodyPr>
+            <a:spAutoFit/>
+          </a:bodyPr>
+          <a:lstStyle/>
+          <a:p>
+            <a:pPr>
+              <a:defRPr/>
+            </a:pPr>
+            <a:r>
+              <a:rPr lang="en-US" sz="4800" dirty="0" smtClean="0">
+                <a:solidFill>
+                  <a:srgbClr val="000000"/>
+                </a:solidFill>
+                <a:latin typeface="Comic Sans MS" pitchFamily="66" charset="0"/>
+              </a:rPr>
+              <a:t>in particular,</a:t>
+            </a:r>
+            <a:endParaRPr lang="en-US" sz="4800" dirty="0" smtClean="0">
+              <a:solidFill>
+                <a:srgbClr val="000000"/>
+              </a:solidFill>
+              <a:latin typeface="Comic Sans MS" pitchFamily="66" charset="0"/>
+            </a:endParaRPr>
+          </a:p>
+          <a:p>
+            <a:pPr>
+              <a:defRPr/>
+            </a:pPr>
+            <a:endParaRPr lang="en-US" sz="3600" dirty="0" smtClean="0">
+              <a:solidFill>
+                <a:schemeClr val="accent1">
+                  <a:lumMod val="50000"/>
+                </a:schemeClr>
+              </a:solidFill>
+              <a:latin typeface="Comic Sans MS"/>
+              <a:cs typeface="Comic Sans MS"/>
+            </a:endParaRPr>
+          </a:p>
+          <a:p>
+            <a:pPr>
+              <a:defRPr/>
+            </a:pPr>
+            <a:r>
+              <a:rPr lang="en-US" sz="3600" dirty="0" smtClean="0">
+                <a:solidFill>
+                  <a:schemeClr val="accent1">
+                    <a:lumMod val="50000"/>
+                  </a:schemeClr>
+                </a:solidFill>
+                <a:latin typeface="Comic Sans MS"/>
+                <a:cs typeface="Comic Sans MS"/>
+              </a:rPr>
+              <a:t> </a:t>
+            </a:r>
+          </a:p>
+          <a:p>
+            <a:pPr>
+              <a:defRPr/>
+            </a:pPr>
+            <a:r>
+              <a:rPr lang="en-US" sz="4800" dirty="0" smtClean="0">
+                <a:solidFill>
+                  <a:schemeClr val="accent1">
+                    <a:lumMod val="50000"/>
+                  </a:schemeClr>
+                </a:solidFill>
+                <a:latin typeface="Comic Sans MS"/>
+                <a:cs typeface="Comic Sans MS"/>
+              </a:rPr>
+              <a:t>       1</a:t>
+            </a:r>
+            <a:r>
+              <a:rPr lang="en-US" sz="4800" dirty="0" smtClean="0">
+                <a:solidFill>
+                  <a:srgbClr val="3333CC"/>
+                </a:solidFill>
+                <a:latin typeface="Comic Sans MS" pitchFamily="66" charset="0"/>
+              </a:rPr>
+              <a:t>   </a:t>
+            </a:r>
+            <a:r>
+              <a:rPr lang="en-US" sz="4800" b="1" dirty="0" smtClean="0">
+                <a:solidFill>
+                  <a:schemeClr val="accent1">
+                    <a:lumMod val="50000"/>
+                  </a:schemeClr>
+                </a:solidFill>
+                <a:latin typeface="Euclid Symbol" charset="2"/>
+                <a:cs typeface="Euclid Symbol" charset="2"/>
+                <a:sym typeface="Euclid Symbol" pitchFamily="18" charset="2"/>
+              </a:rPr>
+              <a:t>≡</a:t>
+            </a:r>
+            <a:r>
+              <a:rPr lang="en-US" sz="4800" dirty="0" smtClean="0">
+                <a:solidFill>
+                  <a:schemeClr val="accent1">
+                    <a:lumMod val="50000"/>
+                  </a:schemeClr>
+                </a:solidFill>
+                <a:latin typeface="Comic Sans MS" pitchFamily="66" charset="0"/>
+                <a:sym typeface="Euclid Symbol" pitchFamily="18" charset="2"/>
+              </a:rPr>
+              <a:t> </a:t>
+            </a:r>
+            <a:r>
+              <a:rPr lang="en-US" sz="4800" dirty="0" smtClean="0">
+                <a:solidFill>
+                  <a:schemeClr val="accent1">
+                    <a:lumMod val="50000"/>
+                  </a:schemeClr>
+                </a:solidFill>
+                <a:latin typeface="Comic Sans MS" pitchFamily="66" charset="0"/>
+              </a:rPr>
+              <a:t>  </a:t>
+            </a:r>
+            <a:r>
+              <a:rPr lang="en-US" sz="4800" dirty="0" err="1" smtClean="0">
+                <a:solidFill>
+                  <a:schemeClr val="accent1">
+                    <a:lumMod val="50000"/>
+                  </a:schemeClr>
+                </a:solidFill>
+                <a:latin typeface="Comic Sans MS" pitchFamily="66" charset="0"/>
+              </a:rPr>
+              <a:t>k</a:t>
+            </a:r>
+            <a:r>
+              <a:rPr lang="en-US" sz="4800" baseline="30000" dirty="0" err="1" smtClean="0">
+                <a:solidFill>
+                  <a:schemeClr val="accent1">
+                    <a:lumMod val="50000"/>
+                  </a:schemeClr>
+                </a:solidFill>
+                <a:latin typeface="Comic Sans MS" pitchFamily="66" charset="0"/>
+              </a:rPr>
+              <a:t>s</a:t>
+            </a:r>
+            <a:r>
+              <a:rPr lang="en-US" sz="4800" dirty="0" smtClean="0">
+                <a:solidFill>
+                  <a:schemeClr val="accent1">
+                    <a:lumMod val="50000"/>
+                  </a:schemeClr>
+                </a:solidFill>
+                <a:latin typeface="Comic Sans MS" pitchFamily="66" charset="0"/>
+              </a:rPr>
+              <a:t>             (</a:t>
+            </a:r>
+            <a:r>
+              <a:rPr lang="en-US" sz="4800" dirty="0" smtClean="0">
+                <a:solidFill>
+                  <a:schemeClr val="accent1">
+                    <a:lumMod val="50000"/>
+                  </a:schemeClr>
+                </a:solidFill>
+                <a:latin typeface="Comic Sans MS" pitchFamily="66" charset="0"/>
+              </a:rPr>
+              <a:t>mod </a:t>
+            </a:r>
+            <a:r>
+              <a:rPr lang="en-US" sz="4800" dirty="0" err="1" smtClean="0">
+                <a:solidFill>
+                  <a:schemeClr val="accent1">
+                    <a:lumMod val="50000"/>
+                  </a:schemeClr>
+                </a:solidFill>
+                <a:latin typeface="Comic Sans MS" pitchFamily="66" charset="0"/>
+              </a:rPr>
+              <a:t>n</a:t>
+            </a:r>
+            <a:r>
+              <a:rPr lang="en-US" sz="4800" dirty="0" smtClean="0">
+                <a:solidFill>
+                  <a:schemeClr val="accent1">
+                    <a:lumMod val="50000"/>
+                  </a:schemeClr>
+                </a:solidFill>
+                <a:latin typeface="Comic Sans MS" pitchFamily="66" charset="0"/>
+              </a:rPr>
+              <a:t>)</a:t>
+            </a:r>
+          </a:p>
+        </p:txBody>
+      </p:sp>
+      <p:sp>
+        <p:nvSpPr>
+          <p:cNvPr id="4" name="Slide Number Placeholder 3"/>
+          <p:cNvSpPr>
+            <a:spLocks noGrp="1"/>
+          </p:cNvSpPr>
+          <p:nvPr>
+            <p:ph type="sldNum" sz="quarter" idx="4"/>
+          </p:nvPr>
+        </p:nvSpPr>
+        <p:spPr>
+          <a:xfrm>
+            <a:off x="6477000" y="6550223"/>
+            <a:ext cx="2667000" cy="307777"/>
+          </a:xfrm>
+        </p:spPr>
+        <p:txBody>
+          <a:bodyPr/>
+          <a:lstStyle/>
+          <a:p>
+            <a:pPr>
+              <a:defRPr/>
+            </a:pPr>
+            <a:r>
+              <a:rPr lang="en-US" dirty="0" err="1" smtClean="0"/>
+              <a:t>lec</a:t>
+            </a:r>
+            <a:r>
+              <a:rPr lang="en-US" dirty="0" smtClean="0"/>
+              <a:t> 5F.</a:t>
+            </a:r>
+            <a:fld id="{93347EBB-FBA4-4869-8D0A-161607B6A013}" type="slidenum">
+              <a:rPr lang="en-US" smtClean="0"/>
+              <a:pPr>
+                <a:defRPr/>
+              </a:pPr>
+              <a:t>25</a:t>
+            </a:fld>
+            <a:endParaRPr lang="en-US" dirty="0"/>
+          </a:p>
+        </p:txBody>
+      </p:sp>
+      <p:sp>
+        <p:nvSpPr>
+          <p:cNvPr id="8196" name="Rectangle 2"/>
+          <p:cNvSpPr>
+            <a:spLocks noGrp="1" noChangeArrowheads="1"/>
+          </p:cNvSpPr>
+          <p:nvPr>
+            <p:ph type="title"/>
+          </p:nvPr>
+        </p:nvSpPr>
+        <p:spPr/>
+        <p:txBody>
+          <a:bodyPr/>
+          <a:lstStyle/>
+          <a:p>
+            <a:pPr eaLnBrk="1" hangingPunct="1"/>
+            <a:r>
+              <a:rPr lang="en-US" dirty="0" smtClean="0"/>
+              <a:t>Proof of Euler’s </a:t>
+            </a:r>
+            <a:r>
+              <a:rPr lang="en-US" dirty="0" err="1" smtClean="0"/>
+              <a:t>Thm</a:t>
+            </a:r>
+            <a:endParaRPr lang="en-US" dirty="0" smtClean="0"/>
+          </a:p>
+        </p:txBody>
+      </p:sp>
+      <p:sp useBgFill="1">
+        <p:nvSpPr>
+          <p:cNvPr id="5" name="TextBox 4"/>
+          <p:cNvSpPr txBox="1"/>
+          <p:nvPr/>
+        </p:nvSpPr>
+        <p:spPr>
+          <a:xfrm>
+            <a:off x="3684678" y="3124200"/>
+            <a:ext cx="887322" cy="523220"/>
+          </a:xfrm>
+          <a:prstGeom prst="rect">
+            <a:avLst/>
+          </a:prstGeom>
+        </p:spPr>
+        <p:txBody>
+          <a:bodyPr wrap="none" rtlCol="0">
+            <a:spAutoFit/>
+          </a:bodyPr>
+          <a:lstStyle/>
+          <a:p>
+            <a:r>
+              <a:rPr lang="en-US" sz="2800" b="1" dirty="0" err="1" smtClean="0">
+                <a:solidFill>
+                  <a:srgbClr val="0000FF"/>
+                </a:solidFill>
+                <a:latin typeface="Euclid Symbol" charset="2"/>
+                <a:cs typeface="Euclid Symbol" charset="2"/>
+                <a:sym typeface="Euclid Symbol"/>
+              </a:rPr>
+              <a:t>φ</a:t>
+            </a:r>
+            <a:r>
+              <a:rPr lang="en-US" sz="2800" dirty="0" err="1" smtClean="0">
+                <a:solidFill>
+                  <a:srgbClr val="0000FF"/>
+                </a:solidFill>
+                <a:latin typeface="+mj-lt"/>
+              </a:rPr>
+              <a:t>(n</a:t>
+            </a:r>
+            <a:r>
+              <a:rPr lang="en-US" sz="2800" dirty="0" smtClean="0">
+                <a:solidFill>
+                  <a:srgbClr val="0000FF"/>
+                </a:solidFill>
+                <a:latin typeface="+mj-lt"/>
+              </a:rPr>
+              <a:t>)</a:t>
+            </a:r>
+            <a:endParaRPr lang="en-US" sz="2800" dirty="0" smtClean="0">
+              <a:solidFill>
+                <a:srgbClr val="0000FF"/>
+              </a:solidFill>
+              <a:latin typeface="+mj-lt"/>
+            </a:endParaRPr>
+          </a:p>
+        </p:txBody>
+      </p:sp>
+      <p:sp>
+        <p:nvSpPr>
+          <p:cNvPr id="6" name="TextBox 5"/>
+          <p:cNvSpPr txBox="1"/>
+          <p:nvPr/>
+        </p:nvSpPr>
+        <p:spPr>
+          <a:xfrm>
+            <a:off x="3624565" y="4191000"/>
+            <a:ext cx="1894870" cy="1015663"/>
+          </a:xfrm>
+          <a:prstGeom prst="rect">
+            <a:avLst/>
+          </a:prstGeom>
+          <a:noFill/>
+        </p:spPr>
+        <p:txBody>
+          <a:bodyPr wrap="none" rtlCol="0">
+            <a:spAutoFit/>
+          </a:bodyPr>
+          <a:lstStyle/>
+          <a:p>
+            <a:r>
+              <a:rPr lang="en-US" sz="6000" dirty="0" smtClean="0">
+                <a:solidFill>
+                  <a:srgbClr val="008000"/>
+                </a:solidFill>
+                <a:latin typeface="+mj-lt"/>
+              </a:rPr>
+              <a:t>QED</a:t>
+            </a:r>
+            <a:endParaRPr lang="en-US" sz="6000" dirty="0" smtClean="0">
+              <a:solidFill>
+                <a:srgbClr val="008000"/>
+              </a:solidFill>
+              <a:latin typeface="+mj-lt"/>
+            </a:endParaRPr>
+          </a:p>
+        </p:txBody>
+      </p:sp>
+    </p:spTree>
+  </p:cSld>
+  <p:clrMapOvr>
+    <a:masterClrMapping/>
+  </p:clrMapOvr>
+  <p:transition spd="slow">
+    <p:fade/>
+  </p:transition>
+  <p:timing>
+    <p:tnLst>
+      <p:par>
+        <p:cTn id="1" dur="indefinite" restart="never" nodeType="tmRoot">
+          <p:childTnLst>
+            <p:seq concurrent="1" nextAc="seek">
+              <p:cTn id="2" dur="indefinite" nodeType="mainSeq">
+                <p:childTnLst>
+                  <p:par>
+                    <p:cTn id="3" fill="hold">
+                      <p:stCondLst>
+                        <p:cond delay="indefinite"/>
+                      </p:stCondLst>
+                      <p:childTnLst>
+                        <p:par>
+                          <p:cTn id="4" fill="hold">
+                            <p:stCondLst>
+                              <p:cond delay="0"/>
+                            </p:stCondLst>
+                            <p:childTnLst>
+                              <p:par>
+                                <p:cTn id="5" presetID="15" presetClass="entr" presetSubtype="0" fill="hold" grpId="0" nodeType="clickEffect">
+                                  <p:stCondLst>
+                                    <p:cond delay="0"/>
+                                  </p:stCondLst>
+                                  <p:childTnLst>
+                                    <p:set>
+                                      <p:cBhvr>
+                                        <p:cTn id="6" dur="1" fill="hold">
+                                          <p:stCondLst>
+                                            <p:cond delay="0"/>
+                                          </p:stCondLst>
+                                        </p:cTn>
+                                        <p:tgtEl>
+                                          <p:spTgt spid="5"/>
+                                        </p:tgtEl>
+                                        <p:attrNameLst>
+                                          <p:attrName>style.visibility</p:attrName>
+                                        </p:attrNameLst>
+                                      </p:cBhvr>
+                                      <p:to>
+                                        <p:strVal val="visible"/>
+                                      </p:to>
+                                    </p:set>
+                                    <p:anim calcmode="lin" valueType="num">
+                                      <p:cBhvr>
+                                        <p:cTn id="7" dur="1000" fill="hold"/>
+                                        <p:tgtEl>
+                                          <p:spTgt spid="5"/>
+                                        </p:tgtEl>
+                                        <p:attrNameLst>
+                                          <p:attrName>ppt_w</p:attrName>
+                                        </p:attrNameLst>
+                                      </p:cBhvr>
+                                      <p:tavLst>
+                                        <p:tav tm="0">
+                                          <p:val>
+                                            <p:fltVal val="0"/>
+                                          </p:val>
+                                        </p:tav>
+                                        <p:tav tm="100000">
+                                          <p:val>
+                                            <p:strVal val="#ppt_w"/>
+                                          </p:val>
+                                        </p:tav>
+                                      </p:tavLst>
+                                    </p:anim>
+                                    <p:anim calcmode="lin" valueType="num">
+                                      <p:cBhvr>
+                                        <p:cTn id="8" dur="1000" fill="hold"/>
+                                        <p:tgtEl>
+                                          <p:spTgt spid="5"/>
+                                        </p:tgtEl>
+                                        <p:attrNameLst>
+                                          <p:attrName>ppt_h</p:attrName>
+                                        </p:attrNameLst>
+                                      </p:cBhvr>
+                                      <p:tavLst>
+                                        <p:tav tm="0">
+                                          <p:val>
+                                            <p:fltVal val="0"/>
+                                          </p:val>
+                                        </p:tav>
+                                        <p:tav tm="100000">
+                                          <p:val>
+                                            <p:strVal val="#ppt_h"/>
+                                          </p:val>
+                                        </p:tav>
+                                      </p:tavLst>
+                                    </p:anim>
+                                    <p:anim calcmode="lin" valueType="num">
+                                      <p:cBhvr>
+                                        <p:cTn id="9" dur="1000" fill="hold"/>
+                                        <p:tgtEl>
+                                          <p:spTgt spid="5"/>
+                                        </p:tgtEl>
+                                        <p:attrNameLst>
+                                          <p:attrName>ppt_x</p:attrName>
+                                        </p:attrNameLst>
+                                      </p:cBhvr>
+                                      <p:tavLst>
+                                        <p:tav tm="0" fmla="#ppt_x+(cos(-2*pi*(1-$))*-#ppt_x-sin(-2*pi*(1-$))*(1-#ppt_y))*(1-$)">
+                                          <p:val>
+                                            <p:fltVal val="0"/>
+                                          </p:val>
+                                        </p:tav>
+                                        <p:tav tm="100000">
+                                          <p:val>
+                                            <p:fltVal val="1"/>
+                                          </p:val>
+                                        </p:tav>
+                                      </p:tavLst>
+                                    </p:anim>
+                                    <p:anim calcmode="lin" valueType="num">
+                                      <p:cBhvr>
+                                        <p:cTn id="10" dur="1000" fill="hold"/>
+                                        <p:tgtEl>
+                                          <p:spTgt spid="5"/>
+                                        </p:tgtEl>
+                                        <p:attrNameLst>
+                                          <p:attrName>ppt_y</p:attrName>
+                                        </p:attrNameLst>
+                                      </p:cBhvr>
+                                      <p:tavLst>
+                                        <p:tav tm="0" fmla="#ppt_y+(sin(-2*pi*(1-$))*-#ppt_x+cos(-2*pi*(1-$))*(1-#ppt_y))*(1-$)">
+                                          <p:val>
+                                            <p:fltVal val="0"/>
+                                          </p:val>
+                                        </p:tav>
+                                        <p:tav tm="100000">
+                                          <p:val>
+                                            <p:fltVal val="1"/>
+                                          </p:val>
+                                        </p:tav>
+                                      </p:tavLst>
+                                    </p:anim>
+                                  </p:childTnLst>
+                                </p:cTn>
+                              </p:par>
+                            </p:childTnLst>
+                          </p:cTn>
+                        </p:par>
+                        <p:par>
+                          <p:cTn id="11" fill="hold">
+                            <p:stCondLst>
+                              <p:cond delay="1000"/>
+                            </p:stCondLst>
+                            <p:childTnLst>
+                              <p:par>
+                                <p:cTn id="12" presetID="2" presetClass="entr" presetSubtype="4" accel="50000" decel="50000" fill="hold" grpId="0" nodeType="afterEffect">
+                                  <p:stCondLst>
+                                    <p:cond delay="0"/>
+                                  </p:stCondLst>
+                                  <p:childTnLst>
+                                    <p:set>
+                                      <p:cBhvr>
+                                        <p:cTn id="13" dur="1" fill="hold">
+                                          <p:stCondLst>
+                                            <p:cond delay="0"/>
+                                          </p:stCondLst>
+                                        </p:cTn>
+                                        <p:tgtEl>
+                                          <p:spTgt spid="6"/>
+                                        </p:tgtEl>
+                                        <p:attrNameLst>
+                                          <p:attrName>style.visibility</p:attrName>
+                                        </p:attrNameLst>
+                                      </p:cBhvr>
+                                      <p:to>
+                                        <p:strVal val="visible"/>
+                                      </p:to>
+                                    </p:set>
+                                    <p:anim calcmode="lin" valueType="num">
+                                      <p:cBhvr additive="base">
+                                        <p:cTn id="14" dur="1000" fill="hold"/>
+                                        <p:tgtEl>
+                                          <p:spTgt spid="6"/>
+                                        </p:tgtEl>
+                                        <p:attrNameLst>
+                                          <p:attrName>ppt_x</p:attrName>
+                                        </p:attrNameLst>
+                                      </p:cBhvr>
+                                      <p:tavLst>
+                                        <p:tav tm="0">
+                                          <p:val>
+                                            <p:strVal val="#ppt_x"/>
+                                          </p:val>
+                                        </p:tav>
+                                        <p:tav tm="100000">
+                                          <p:val>
+                                            <p:strVal val="#ppt_x"/>
+                                          </p:val>
+                                        </p:tav>
+                                      </p:tavLst>
+                                    </p:anim>
+                                    <p:anim calcmode="lin" valueType="num">
+                                      <p:cBhvr additive="base">
+                                        <p:cTn id="15" dur="1000" fill="hold"/>
+                                        <p:tgtEl>
+                                          <p:spTgt spid="6"/>
+                                        </p:tgtEl>
+                                        <p:attrNameLst>
+                                          <p:attrName>ppt_y</p:attrName>
+                                        </p:attrNameLst>
+                                      </p:cBhvr>
+                                      <p:tavLst>
+                                        <p:tav tm="0">
+                                          <p:val>
+                                            <p:strVal val="1+#ppt_h/2"/>
+                                          </p:val>
+                                        </p:tav>
+                                        <p:tav tm="100000">
+                                          <p:val>
+                                            <p:strVal val="#ppt_y"/>
+                                          </p:val>
+                                        </p:tav>
+                                      </p:tavLst>
+                                    </p:anim>
+                                  </p:childTnLst>
+                                </p:cTn>
+                              </p:par>
+                            </p:childTnLst>
+                          </p:cTn>
+                        </p:par>
+                      </p:childTnLst>
+                    </p:cTn>
+                  </p:par>
+                </p:childTnLst>
+              </p:cTn>
+              <p:prevCondLst>
+                <p:cond evt="onPrev" delay="0">
+                  <p:tgtEl>
+                    <p:sldTgt/>
+                  </p:tgtEl>
+                </p:cond>
+              </p:prevCondLst>
+              <p:nextCondLst>
+                <p:cond evt="onNext" delay="0">
+                  <p:tgtEl>
+                    <p:sldTgt/>
+                  </p:tgtEl>
+                </p:cond>
+              </p:nextCondLst>
+            </p:seq>
+          </p:childTnLst>
+        </p:cTn>
+      </p:par>
+    </p:tnLst>
+    <p:bldLst>
+      <p:bldP spid="5" grpId="0" animBg="1"/>
+      <p:bldP spid="6" grpId="0"/>
+    </p:bldLst>
+  </p:timing>
+</p:sld>
+</file>
+
+<file path=ppt/slides/slide26.xml><?xml version="1.0" encoding="utf-8"?>
 <p:sld xmlns:a="http://schemas.openxmlformats.org/drawingml/2006/main" xmlns:r="http://schemas.openxmlformats.org/officeDocument/2006/relationships" xmlns:mc="http://schemas.openxmlformats.org/markup-compatibility/2006" xmlns:mv="urn:schemas-microsoft-com:mac:vml" xmlns:p="http://schemas.openxmlformats.org/presentationml/2006/main" mc:Ignorable="mv" mc:PreserveAttributes="mv:*" show="0">
   <p:cSld>
     <p:spTree>
@@ -16819,7 +17322,7 @@
               <a:pPr>
                 <a:defRPr/>
               </a:pPr>
-              <a:t>25</a:t>
+              <a:t>26</a:t>
             </a:fld>
             <a:endParaRPr lang="en-US" dirty="0"/>
           </a:p>
@@ -17016,7 +17519,7 @@
 </p:sld>
 </file>
 
-<file path=ppt/slides/slide26.xml><?xml version="1.0" encoding="utf-8"?>
+<file path=ppt/slides/slide27.xml><?xml version="1.0" encoding="utf-8"?>
 <p:sld xmlns:a="http://schemas.openxmlformats.org/drawingml/2006/main" xmlns:r="http://schemas.openxmlformats.org/officeDocument/2006/relationships" xmlns:mc="http://schemas.openxmlformats.org/markup-compatibility/2006" xmlns:mv="urn:schemas-microsoft-com:mac:vml" xmlns:p="http://schemas.openxmlformats.org/presentationml/2006/main" mc:Ignorable="mv" mc:PreserveAttributes="mv:*" show="0">
   <p:cSld>
     <p:spTree>
@@ -17069,7 +17572,7 @@
               <a:pPr>
                 <a:defRPr/>
               </a:pPr>
-              <a:t>26</a:t>
+              <a:t>27</a:t>
             </a:fld>
             <a:endParaRPr lang="en-US" dirty="0"/>
           </a:p>
@@ -17156,7 +17659,7 @@
 </p:sld>
 </file>
 
-<file path=ppt/slides/slide27.xml><?xml version="1.0" encoding="utf-8"?>
+<file path=ppt/slides/slide28.xml><?xml version="1.0" encoding="utf-8"?>
 <p:sld xmlns:a="http://schemas.openxmlformats.org/drawingml/2006/main" xmlns:r="http://schemas.openxmlformats.org/officeDocument/2006/relationships" xmlns:mc="http://schemas.openxmlformats.org/markup-compatibility/2006" xmlns:mv="urn:schemas-microsoft-com:mac:vml" xmlns:p="http://schemas.openxmlformats.org/presentationml/2006/main" mc:Ignorable="mv" mc:PreserveAttributes="mv:*" show="0">
   <p:cSld>
     <p:spTree>
@@ -17229,7 +17732,7 @@
               <a:pPr>
                 <a:defRPr/>
               </a:pPr>
-              <a:t>27</a:t>
+              <a:t>28</a:t>
             </a:fld>
             <a:endParaRPr lang="en-US" dirty="0"/>
           </a:p>
@@ -17296,7 +17799,7 @@
 </p:sld>
 </file>
 
-<file path=ppt/slides/slide28.xml><?xml version="1.0" encoding="utf-8"?>
+<file path=ppt/slides/slide29.xml><?xml version="1.0" encoding="utf-8"?>
 <p:sld xmlns:a="http://schemas.openxmlformats.org/drawingml/2006/main" xmlns:r="http://schemas.openxmlformats.org/officeDocument/2006/relationships" xmlns:mc="http://schemas.openxmlformats.org/markup-compatibility/2006" xmlns:mv="urn:schemas-microsoft-com:mac:vml" xmlns:p="http://schemas.openxmlformats.org/presentationml/2006/main" mc:Ignorable="mv" mc:PreserveAttributes="mv:*" show="0">
   <p:cSld>
     <p:spTree>
@@ -17349,7 +17852,7 @@
               <a:pPr>
                 <a:defRPr/>
               </a:pPr>
-              <a:t>28</a:t>
+              <a:t>29</a:t>
             </a:fld>
             <a:endParaRPr lang="en-US" dirty="0"/>
           </a:p>
@@ -18147,532 +18650,6 @@
 </p:sld>
 </file>
 
-<file path=ppt/slides/slide29.xml><?xml version="1.0" encoding="utf-8"?>
-<p:sld xmlns:a="http://schemas.openxmlformats.org/drawingml/2006/main" xmlns:r="http://schemas.openxmlformats.org/officeDocument/2006/relationships" xmlns:mc="http://schemas.openxmlformats.org/markup-compatibility/2006" xmlns:mv="urn:schemas-microsoft-com:mac:vml" xmlns:p="http://schemas.openxmlformats.org/presentationml/2006/main" mc:Ignorable="mv" mc:PreserveAttributes="mv:*" show="0">
-  <p:cSld>
-    <p:spTree>
-      <p:nvGrpSpPr>
-        <p:cNvPr id="1" name=""/>
-        <p:cNvGrpSpPr/>
-        <p:nvPr/>
-      </p:nvGrpSpPr>
-      <p:grpSpPr>
-        <a:xfrm>
-          <a:off x="0" y="0"/>
-          <a:ext cx="0" cy="0"/>
-          <a:chOff x="0" y="0"/>
-          <a:chExt cx="0" cy="0"/>
-        </a:xfrm>
-      </p:grpSpPr>
-      <p:sp>
-        <p:nvSpPr>
-          <p:cNvPr id="4" name="Slide Number Placeholder 3"/>
-          <p:cNvSpPr>
-            <a:spLocks noGrp="1"/>
-          </p:cNvSpPr>
-          <p:nvPr>
-            <p:ph type="sldNum" sz="quarter" idx="4"/>
-          </p:nvPr>
-        </p:nvSpPr>
-        <p:spPr>
-          <a:xfrm>
-            <a:off x="6477000" y="6553200"/>
-            <a:ext cx="2667000" cy="307777"/>
-          </a:xfrm>
-        </p:spPr>
-        <p:txBody>
-          <a:bodyPr/>
-          <a:lstStyle/>
-          <a:p>
-            <a:pPr>
-              <a:defRPr/>
-            </a:pPr>
-            <a:r>
-              <a:rPr lang="en-US" dirty="0" err="1" smtClean="0"/>
-              <a:t>lec</a:t>
-            </a:r>
-            <a:r>
-              <a:rPr lang="en-US" dirty="0" smtClean="0"/>
-              <a:t> 5F.</a:t>
-            </a:r>
-            <a:fld id="{6A5E9C01-C108-4A5C-AE7A-FB77D488E7D9}" type="slidenum">
-              <a:rPr lang="en-US" smtClean="0"/>
-              <a:pPr>
-                <a:defRPr/>
-              </a:pPr>
-              <a:t>29</a:t>
-            </a:fld>
-            <a:endParaRPr lang="en-US" dirty="0"/>
-          </a:p>
-        </p:txBody>
-      </p:sp>
-      <p:sp>
-        <p:nvSpPr>
-          <p:cNvPr id="16387" name="Rectangle 2"/>
-          <p:cNvSpPr>
-            <a:spLocks noGrp="1" noChangeArrowheads="1"/>
-          </p:cNvSpPr>
-          <p:nvPr>
-            <p:ph type="title"/>
-          </p:nvPr>
-        </p:nvSpPr>
-        <p:spPr/>
-        <p:txBody>
-          <a:bodyPr/>
-          <a:lstStyle/>
-          <a:p>
-            <a:pPr eaLnBrk="1" hangingPunct="1"/>
-            <a:r>
-              <a:rPr lang="en-US" dirty="0" smtClean="0"/>
-              <a:t>Receiver’s abilities</a:t>
-            </a:r>
-          </a:p>
-        </p:txBody>
-      </p:sp>
-      <p:sp>
-        <p:nvSpPr>
-          <p:cNvPr id="408579" name="Rectangle 3"/>
-          <p:cNvSpPr>
-            <a:spLocks noGrp="1" noChangeArrowheads="1"/>
-          </p:cNvSpPr>
-          <p:nvPr>
-            <p:ph type="body" idx="1"/>
-          </p:nvPr>
-        </p:nvSpPr>
-        <p:spPr>
-          <a:xfrm>
-            <a:off x="533400" y="838200"/>
-            <a:ext cx="8229600" cy="5943600"/>
-          </a:xfrm>
-        </p:spPr>
-        <p:txBody>
-          <a:bodyPr/>
-          <a:lstStyle/>
-          <a:p>
-            <a:pPr eaLnBrk="1" hangingPunct="1"/>
-            <a:r>
-              <a:rPr lang="en-US" sz="4000" dirty="0" smtClean="0"/>
-              <a:t>find two large primes  </a:t>
-            </a:r>
-            <a:r>
-              <a:rPr lang="en-US" sz="4000" dirty="0" smtClean="0">
-                <a:solidFill>
-                  <a:schemeClr val="accent5">
-                    <a:lumMod val="50000"/>
-                  </a:schemeClr>
-                </a:solidFill>
-              </a:rPr>
-              <a:t>p, q</a:t>
-            </a:r>
-          </a:p>
-          <a:p>
-            <a:pPr eaLnBrk="1" hangingPunct="1">
-              <a:buFontTx/>
-              <a:buNone/>
-            </a:pPr>
-            <a:r>
-              <a:rPr lang="en-US" sz="4000" i="1" dirty="0" smtClean="0">
-                <a:solidFill>
-                  <a:srgbClr val="3333CC"/>
-                </a:solidFill>
-              </a:rPr>
-              <a:t>   </a:t>
-            </a:r>
-            <a:r>
-              <a:rPr lang="en-US" sz="4000" i="1" dirty="0" smtClean="0"/>
-              <a:t>- </a:t>
-            </a:r>
-            <a:r>
-              <a:rPr lang="en-US" sz="4000" dirty="0" smtClean="0"/>
-              <a:t>ok because: lots of primes</a:t>
-            </a:r>
-          </a:p>
-          <a:p>
-            <a:pPr eaLnBrk="1" hangingPunct="1">
-              <a:buFontTx/>
-              <a:buNone/>
-            </a:pPr>
-            <a:r>
-              <a:rPr lang="en-US" sz="4000" dirty="0" smtClean="0"/>
-              <a:t>   - fast test for </a:t>
-            </a:r>
-            <a:r>
-              <a:rPr lang="en-US" sz="4000" dirty="0" err="1" smtClean="0"/>
-              <a:t>primality</a:t>
-            </a:r>
-            <a:endParaRPr lang="en-US" sz="4000" dirty="0" smtClean="0"/>
-          </a:p>
-          <a:p>
-            <a:pPr eaLnBrk="1" hangingPunct="1"/>
-            <a:r>
-              <a:rPr lang="en-US" sz="4000" dirty="0" smtClean="0"/>
-              <a:t>find</a:t>
-            </a:r>
-            <a:r>
-              <a:rPr lang="en-US" sz="4000" dirty="0" smtClean="0">
-                <a:solidFill>
-                  <a:schemeClr val="accent5">
-                    <a:lumMod val="50000"/>
-                  </a:schemeClr>
-                </a:solidFill>
-              </a:rPr>
-              <a:t> e</a:t>
-            </a:r>
-            <a:r>
-              <a:rPr lang="en-US" sz="4000" dirty="0" smtClean="0">
-                <a:solidFill>
-                  <a:srgbClr val="3333CC"/>
-                </a:solidFill>
-              </a:rPr>
-              <a:t> </a:t>
-            </a:r>
-            <a:r>
-              <a:rPr lang="en-US" sz="4000" dirty="0" smtClean="0"/>
-              <a:t>rel. prime to</a:t>
-            </a:r>
-            <a:r>
-              <a:rPr lang="en-US" sz="4000" dirty="0" smtClean="0">
-                <a:solidFill>
-                  <a:schemeClr val="accent5">
-                    <a:lumMod val="50000"/>
-                  </a:schemeClr>
-                </a:solidFill>
-              </a:rPr>
-              <a:t> (p-1)(q-1)</a:t>
-            </a:r>
-          </a:p>
-          <a:p>
-            <a:pPr eaLnBrk="1" hangingPunct="1">
-              <a:buFontTx/>
-              <a:buNone/>
-            </a:pPr>
-            <a:r>
-              <a:rPr lang="en-US" sz="4000" dirty="0" smtClean="0">
-                <a:solidFill>
-                  <a:srgbClr val="3333CC"/>
-                </a:solidFill>
-              </a:rPr>
-              <a:t>   </a:t>
-            </a:r>
-            <a:r>
-              <a:rPr lang="en-US" sz="4000" dirty="0" smtClean="0"/>
-              <a:t>- ok: lots of rel. prime </a:t>
-            </a:r>
-            <a:r>
-              <a:rPr lang="en-US" sz="4000" dirty="0" err="1" smtClean="0"/>
-              <a:t>nums</a:t>
-            </a:r>
-            <a:endParaRPr lang="en-US" sz="4000" dirty="0" smtClean="0"/>
-          </a:p>
-          <a:p>
-            <a:pPr eaLnBrk="1" hangingPunct="1">
-              <a:buFontTx/>
-              <a:buNone/>
-            </a:pPr>
-            <a:r>
-              <a:rPr lang="en-US" sz="4000" dirty="0" smtClean="0"/>
-              <a:t>   - </a:t>
-            </a:r>
-            <a:r>
-              <a:rPr lang="en-US" sz="4000" dirty="0" err="1" smtClean="0"/>
-              <a:t>gcd</a:t>
-            </a:r>
-            <a:r>
-              <a:rPr lang="en-US" sz="4000" dirty="0" smtClean="0"/>
-              <a:t> easy to compute</a:t>
-            </a:r>
-          </a:p>
-          <a:p>
-            <a:pPr eaLnBrk="1" hangingPunct="1"/>
-            <a:r>
-              <a:rPr lang="en-US" sz="4000" dirty="0" smtClean="0"/>
-              <a:t>find </a:t>
-            </a:r>
-            <a:r>
-              <a:rPr lang="en-US" sz="4000" dirty="0" smtClean="0">
-                <a:solidFill>
-                  <a:schemeClr val="accent5">
-                    <a:lumMod val="50000"/>
-                  </a:schemeClr>
-                </a:solidFill>
-              </a:rPr>
-              <a:t>(mod (p-1)(q-1)) </a:t>
-            </a:r>
-            <a:r>
-              <a:rPr lang="en-US" sz="4000" dirty="0" smtClean="0"/>
-              <a:t>inverse of </a:t>
-            </a:r>
-            <a:r>
-              <a:rPr lang="en-US" sz="4000" dirty="0" smtClean="0">
-                <a:solidFill>
-                  <a:schemeClr val="accent5">
-                    <a:lumMod val="50000"/>
-                  </a:schemeClr>
-                </a:solidFill>
-              </a:rPr>
-              <a:t>e </a:t>
-            </a:r>
-          </a:p>
-          <a:p>
-            <a:pPr eaLnBrk="1" hangingPunct="1">
-              <a:buFontTx/>
-              <a:buNone/>
-            </a:pPr>
-            <a:r>
-              <a:rPr lang="en-US" sz="4000" dirty="0" smtClean="0">
-                <a:solidFill>
-                  <a:srgbClr val="3333CC"/>
-                </a:solidFill>
-              </a:rPr>
-              <a:t>   </a:t>
-            </a:r>
-            <a:r>
-              <a:rPr lang="en-US" sz="4000" dirty="0" smtClean="0"/>
-              <a:t>- easy using </a:t>
-            </a:r>
-            <a:r>
-              <a:rPr lang="en-US" sz="4000" dirty="0" err="1" smtClean="0"/>
-              <a:t>Pulverizer</a:t>
-            </a:r>
-            <a:r>
-              <a:rPr lang="en-US" sz="4000" dirty="0" smtClean="0"/>
-              <a:t> or Euler</a:t>
-            </a:r>
-          </a:p>
-        </p:txBody>
-      </p:sp>
-    </p:spTree>
-  </p:cSld>
-  <p:clrMapOvr>
-    <a:masterClrMapping/>
-  </p:clrMapOvr>
-  <p:transition>
-    <p:fade/>
-  </p:transition>
-  <p:timing>
-    <p:tnLst>
-      <p:par>
-        <p:cTn id="1" dur="indefinite" restart="never" nodeType="tmRoot">
-          <p:childTnLst>
-            <p:seq concurrent="1" nextAc="seek">
-              <p:cTn id="2" dur="indefinite" nodeType="mainSeq">
-                <p:childTnLst>
-                  <p:par>
-                    <p:cTn id="3" fill="hold">
-                      <p:stCondLst>
-                        <p:cond delay="indefinite"/>
-                      </p:stCondLst>
-                      <p:childTnLst>
-                        <p:par>
-                          <p:cTn id="4" fill="hold">
-                            <p:stCondLst>
-                              <p:cond delay="0"/>
-                            </p:stCondLst>
-                            <p:childTnLst>
-                              <p:par>
-                                <p:cTn id="5" presetID="1" presetClass="entr" presetSubtype="0" fill="hold" nodeType="clickEffect">
-                                  <p:stCondLst>
-                                    <p:cond delay="0"/>
-                                  </p:stCondLst>
-                                  <p:childTnLst>
-                                    <p:set>
-                                      <p:cBhvr>
-                                        <p:cTn id="6" dur="1" fill="hold">
-                                          <p:stCondLst>
-                                            <p:cond delay="0"/>
-                                          </p:stCondLst>
-                                        </p:cTn>
-                                        <p:tgtEl>
-                                          <p:spTgt spid="408579">
-                                            <p:txEl>
-                                              <p:pRg st="3" end="3"/>
-                                            </p:txEl>
-                                          </p:spTgt>
-                                        </p:tgtEl>
-                                        <p:attrNameLst>
-                                          <p:attrName>style.visibility</p:attrName>
-                                        </p:attrNameLst>
-                                      </p:cBhvr>
-                                      <p:to>
-                                        <p:strVal val="visible"/>
-                                      </p:to>
-                                    </p:set>
-                                  </p:childTnLst>
-                                </p:cTn>
-                              </p:par>
-                              <p:par>
-                                <p:cTn id="7" presetID="1" presetClass="entr" presetSubtype="0" fill="hold" nodeType="withEffect">
-                                  <p:stCondLst>
-                                    <p:cond delay="0"/>
-                                  </p:stCondLst>
-                                  <p:childTnLst>
-                                    <p:set>
-                                      <p:cBhvr>
-                                        <p:cTn id="8" dur="1" fill="hold">
-                                          <p:stCondLst>
-                                            <p:cond delay="0"/>
-                                          </p:stCondLst>
-                                        </p:cTn>
-                                        <p:tgtEl>
-                                          <p:spTgt spid="408579">
-                                            <p:txEl>
-                                              <p:pRg st="4" end="4"/>
-                                            </p:txEl>
-                                          </p:spTgt>
-                                        </p:tgtEl>
-                                        <p:attrNameLst>
-                                          <p:attrName>style.visibility</p:attrName>
-                                        </p:attrNameLst>
-                                      </p:cBhvr>
-                                      <p:to>
-                                        <p:strVal val="visible"/>
-                                      </p:to>
-                                    </p:set>
-                                  </p:childTnLst>
-                                </p:cTn>
-                              </p:par>
-                              <p:par>
-                                <p:cTn id="9" presetID="1" presetClass="entr" presetSubtype="0" fill="hold" nodeType="withEffect">
-                                  <p:stCondLst>
-                                    <p:cond delay="0"/>
-                                  </p:stCondLst>
-                                  <p:childTnLst>
-                                    <p:set>
-                                      <p:cBhvr>
-                                        <p:cTn id="10" dur="1" fill="hold">
-                                          <p:stCondLst>
-                                            <p:cond delay="0"/>
-                                          </p:stCondLst>
-                                        </p:cTn>
-                                        <p:tgtEl>
-                                          <p:spTgt spid="408579">
-                                            <p:txEl>
-                                              <p:pRg st="5" end="5"/>
-                                            </p:txEl>
-                                          </p:spTgt>
-                                        </p:tgtEl>
-                                        <p:attrNameLst>
-                                          <p:attrName>style.visibility</p:attrName>
-                                        </p:attrNameLst>
-                                      </p:cBhvr>
-                                      <p:to>
-                                        <p:strVal val="visible"/>
-                                      </p:to>
-                                    </p:set>
-                                  </p:childTnLst>
-                                </p:cTn>
-                              </p:par>
-                            </p:childTnLst>
-                          </p:cTn>
-                        </p:par>
-                      </p:childTnLst>
-                    </p:cTn>
-                  </p:par>
-                  <p:par>
-                    <p:cTn id="11" fill="hold">
-                      <p:stCondLst>
-                        <p:cond delay="indefinite"/>
-                      </p:stCondLst>
-                      <p:childTnLst>
-                        <p:par>
-                          <p:cTn id="12" fill="hold">
-                            <p:stCondLst>
-                              <p:cond delay="0"/>
-                            </p:stCondLst>
-                            <p:childTnLst>
-                              <p:par>
-                                <p:cTn id="13" presetID="1" presetClass="entr" presetSubtype="0" fill="hold" nodeType="clickEffect">
-                                  <p:stCondLst>
-                                    <p:cond delay="0"/>
-                                  </p:stCondLst>
-                                  <p:childTnLst>
-                                    <p:set>
-                                      <p:cBhvr>
-                                        <p:cTn id="14" dur="1" fill="hold">
-                                          <p:stCondLst>
-                                            <p:cond delay="0"/>
-                                          </p:stCondLst>
-                                        </p:cTn>
-                                        <p:tgtEl>
-                                          <p:spTgt spid="408579">
-                                            <p:txEl>
-                                              <p:pRg st="6" end="6"/>
-                                            </p:txEl>
-                                          </p:spTgt>
-                                        </p:tgtEl>
-                                        <p:attrNameLst>
-                                          <p:attrName>style.visibility</p:attrName>
-                                        </p:attrNameLst>
-                                      </p:cBhvr>
-                                      <p:to>
-                                        <p:strVal val="visible"/>
-                                      </p:to>
-                                    </p:set>
-                                  </p:childTnLst>
-                                </p:cTn>
-                              </p:par>
-                              <p:par>
-                                <p:cTn id="15" presetID="1" presetClass="entr" presetSubtype="0" fill="hold" nodeType="withEffect">
-                                  <p:stCondLst>
-                                    <p:cond delay="0"/>
-                                  </p:stCondLst>
-                                  <p:childTnLst>
-                                    <p:set>
-                                      <p:cBhvr>
-                                        <p:cTn id="16" dur="1" fill="hold">
-                                          <p:stCondLst>
-                                            <p:cond delay="0"/>
-                                          </p:stCondLst>
-                                        </p:cTn>
-                                        <p:tgtEl>
-                                          <p:spTgt spid="408579">
-                                            <p:txEl>
-                                              <p:pRg st="7" end="7"/>
-                                            </p:txEl>
-                                          </p:spTgt>
-                                        </p:tgtEl>
-                                        <p:attrNameLst>
-                                          <p:attrName>style.visibility</p:attrName>
-                                        </p:attrNameLst>
-                                      </p:cBhvr>
-                                      <p:to>
-                                        <p:strVal val="visible"/>
-                                      </p:to>
-                                    </p:set>
-                                  </p:childTnLst>
-                                </p:cTn>
-                              </p:par>
-                            </p:childTnLst>
-                          </p:cTn>
-                        </p:par>
-                      </p:childTnLst>
-                    </p:cTn>
-                  </p:par>
-                </p:childTnLst>
-              </p:cTn>
-              <p:prevCondLst>
-                <p:cond evt="onPrev" delay="0">
-                  <p:tgtEl>
-                    <p:sldTgt/>
-                  </p:tgtEl>
-                </p:cond>
-              </p:prevCondLst>
-              <p:nextCondLst>
-                <p:cond evt="onNext" delay="0">
-                  <p:tgtEl>
-                    <p:sldTgt/>
-                  </p:tgtEl>
-                </p:cond>
-              </p:nextCondLst>
-            </p:seq>
-          </p:childTnLst>
-        </p:cTn>
-      </p:par>
-    </p:tnLst>
-  </p:timing>
-</p:sld>
-</file>
-
 <file path=ppt/slides/slide3.xml><?xml version="1.0" encoding="utf-8"?>
 <p:sld xmlns:a="http://schemas.openxmlformats.org/drawingml/2006/main" xmlns:r="http://schemas.openxmlformats.org/officeDocument/2006/relationships" xmlns:mc="http://schemas.openxmlformats.org/markup-compatibility/2006" xmlns:mv="urn:schemas-microsoft-com:mac:vml" xmlns:p="http://schemas.openxmlformats.org/presentationml/2006/main" mc:Ignorable="mv" mc:PreserveAttributes="mv:*">
   <p:cSld>
@@ -18840,7 +18817,7 @@
                 </a:solidFill>
                 <a:sym typeface="Euclid Symbol" pitchFamily="18" charset="2"/>
               </a:rPr>
-              <a:t> 0,1,…,n-1</a:t>
+              <a:t> [0,n)</a:t>
             </a:r>
             <a:r>
               <a:rPr lang="en-US" sz="5400" dirty="0" smtClean="0">
@@ -19462,12 +19439,538 @@
               <a:rPr lang="en-US" dirty="0" smtClean="0"/>
               <a:t> 5F.</a:t>
             </a:r>
+            <a:fld id="{6A5E9C01-C108-4A5C-AE7A-FB77D488E7D9}" type="slidenum">
+              <a:rPr lang="en-US" smtClean="0"/>
+              <a:pPr>
+                <a:defRPr/>
+              </a:pPr>
+              <a:t>30</a:t>
+            </a:fld>
+            <a:endParaRPr lang="en-US" dirty="0"/>
+          </a:p>
+        </p:txBody>
+      </p:sp>
+      <p:sp>
+        <p:nvSpPr>
+          <p:cNvPr id="16387" name="Rectangle 2"/>
+          <p:cNvSpPr>
+            <a:spLocks noGrp="1" noChangeArrowheads="1"/>
+          </p:cNvSpPr>
+          <p:nvPr>
+            <p:ph type="title"/>
+          </p:nvPr>
+        </p:nvSpPr>
+        <p:spPr/>
+        <p:txBody>
+          <a:bodyPr/>
+          <a:lstStyle/>
+          <a:p>
+            <a:pPr eaLnBrk="1" hangingPunct="1"/>
+            <a:r>
+              <a:rPr lang="en-US" dirty="0" smtClean="0"/>
+              <a:t>Receiver’s abilities</a:t>
+            </a:r>
+          </a:p>
+        </p:txBody>
+      </p:sp>
+      <p:sp>
+        <p:nvSpPr>
+          <p:cNvPr id="408579" name="Rectangle 3"/>
+          <p:cNvSpPr>
+            <a:spLocks noGrp="1" noChangeArrowheads="1"/>
+          </p:cNvSpPr>
+          <p:nvPr>
+            <p:ph type="body" idx="1"/>
+          </p:nvPr>
+        </p:nvSpPr>
+        <p:spPr>
+          <a:xfrm>
+            <a:off x="533400" y="838200"/>
+            <a:ext cx="8229600" cy="5943600"/>
+          </a:xfrm>
+        </p:spPr>
+        <p:txBody>
+          <a:bodyPr/>
+          <a:lstStyle/>
+          <a:p>
+            <a:pPr eaLnBrk="1" hangingPunct="1"/>
+            <a:r>
+              <a:rPr lang="en-US" sz="4000" dirty="0" smtClean="0"/>
+              <a:t>find two large primes  </a:t>
+            </a:r>
+            <a:r>
+              <a:rPr lang="en-US" sz="4000" dirty="0" smtClean="0">
+                <a:solidFill>
+                  <a:schemeClr val="accent5">
+                    <a:lumMod val="50000"/>
+                  </a:schemeClr>
+                </a:solidFill>
+              </a:rPr>
+              <a:t>p, q</a:t>
+            </a:r>
+          </a:p>
+          <a:p>
+            <a:pPr eaLnBrk="1" hangingPunct="1">
+              <a:buFontTx/>
+              <a:buNone/>
+            </a:pPr>
+            <a:r>
+              <a:rPr lang="en-US" sz="4000" i="1" dirty="0" smtClean="0">
+                <a:solidFill>
+                  <a:srgbClr val="3333CC"/>
+                </a:solidFill>
+              </a:rPr>
+              <a:t>   </a:t>
+            </a:r>
+            <a:r>
+              <a:rPr lang="en-US" sz="4000" i="1" dirty="0" smtClean="0"/>
+              <a:t>- </a:t>
+            </a:r>
+            <a:r>
+              <a:rPr lang="en-US" sz="4000" dirty="0" smtClean="0"/>
+              <a:t>ok because: lots of primes</a:t>
+            </a:r>
+          </a:p>
+          <a:p>
+            <a:pPr eaLnBrk="1" hangingPunct="1">
+              <a:buFontTx/>
+              <a:buNone/>
+            </a:pPr>
+            <a:r>
+              <a:rPr lang="en-US" sz="4000" dirty="0" smtClean="0"/>
+              <a:t>   - fast test for </a:t>
+            </a:r>
+            <a:r>
+              <a:rPr lang="en-US" sz="4000" dirty="0" err="1" smtClean="0"/>
+              <a:t>primality</a:t>
+            </a:r>
+            <a:endParaRPr lang="en-US" sz="4000" dirty="0" smtClean="0"/>
+          </a:p>
+          <a:p>
+            <a:pPr eaLnBrk="1" hangingPunct="1"/>
+            <a:r>
+              <a:rPr lang="en-US" sz="4000" dirty="0" smtClean="0"/>
+              <a:t>find</a:t>
+            </a:r>
+            <a:r>
+              <a:rPr lang="en-US" sz="4000" dirty="0" smtClean="0">
+                <a:solidFill>
+                  <a:schemeClr val="accent5">
+                    <a:lumMod val="50000"/>
+                  </a:schemeClr>
+                </a:solidFill>
+              </a:rPr>
+              <a:t> e</a:t>
+            </a:r>
+            <a:r>
+              <a:rPr lang="en-US" sz="4000" dirty="0" smtClean="0">
+                <a:solidFill>
+                  <a:srgbClr val="3333CC"/>
+                </a:solidFill>
+              </a:rPr>
+              <a:t> </a:t>
+            </a:r>
+            <a:r>
+              <a:rPr lang="en-US" sz="4000" dirty="0" smtClean="0"/>
+              <a:t>rel. prime to</a:t>
+            </a:r>
+            <a:r>
+              <a:rPr lang="en-US" sz="4000" dirty="0" smtClean="0">
+                <a:solidFill>
+                  <a:schemeClr val="accent5">
+                    <a:lumMod val="50000"/>
+                  </a:schemeClr>
+                </a:solidFill>
+              </a:rPr>
+              <a:t> (p-1)(q-1)</a:t>
+            </a:r>
+          </a:p>
+          <a:p>
+            <a:pPr eaLnBrk="1" hangingPunct="1">
+              <a:buFontTx/>
+              <a:buNone/>
+            </a:pPr>
+            <a:r>
+              <a:rPr lang="en-US" sz="4000" dirty="0" smtClean="0">
+                <a:solidFill>
+                  <a:srgbClr val="3333CC"/>
+                </a:solidFill>
+              </a:rPr>
+              <a:t>   </a:t>
+            </a:r>
+            <a:r>
+              <a:rPr lang="en-US" sz="4000" dirty="0" smtClean="0"/>
+              <a:t>- ok: lots of rel. prime </a:t>
+            </a:r>
+            <a:r>
+              <a:rPr lang="en-US" sz="4000" dirty="0" err="1" smtClean="0"/>
+              <a:t>nums</a:t>
+            </a:r>
+            <a:endParaRPr lang="en-US" sz="4000" dirty="0" smtClean="0"/>
+          </a:p>
+          <a:p>
+            <a:pPr eaLnBrk="1" hangingPunct="1">
+              <a:buFontTx/>
+              <a:buNone/>
+            </a:pPr>
+            <a:r>
+              <a:rPr lang="en-US" sz="4000" dirty="0" smtClean="0"/>
+              <a:t>   - </a:t>
+            </a:r>
+            <a:r>
+              <a:rPr lang="en-US" sz="4000" dirty="0" err="1" smtClean="0"/>
+              <a:t>gcd</a:t>
+            </a:r>
+            <a:r>
+              <a:rPr lang="en-US" sz="4000" dirty="0" smtClean="0"/>
+              <a:t> easy to compute</a:t>
+            </a:r>
+          </a:p>
+          <a:p>
+            <a:pPr eaLnBrk="1" hangingPunct="1"/>
+            <a:r>
+              <a:rPr lang="en-US" sz="4000" dirty="0" smtClean="0"/>
+              <a:t>find </a:t>
+            </a:r>
+            <a:r>
+              <a:rPr lang="en-US" sz="4000" dirty="0" smtClean="0">
+                <a:solidFill>
+                  <a:schemeClr val="accent5">
+                    <a:lumMod val="50000"/>
+                  </a:schemeClr>
+                </a:solidFill>
+              </a:rPr>
+              <a:t>(mod (p-1)(q-1)) </a:t>
+            </a:r>
+            <a:r>
+              <a:rPr lang="en-US" sz="4000" dirty="0" smtClean="0"/>
+              <a:t>inverse of </a:t>
+            </a:r>
+            <a:r>
+              <a:rPr lang="en-US" sz="4000" dirty="0" smtClean="0">
+                <a:solidFill>
+                  <a:schemeClr val="accent5">
+                    <a:lumMod val="50000"/>
+                  </a:schemeClr>
+                </a:solidFill>
+              </a:rPr>
+              <a:t>e </a:t>
+            </a:r>
+          </a:p>
+          <a:p>
+            <a:pPr eaLnBrk="1" hangingPunct="1">
+              <a:buFontTx/>
+              <a:buNone/>
+            </a:pPr>
+            <a:r>
+              <a:rPr lang="en-US" sz="4000" dirty="0" smtClean="0">
+                <a:solidFill>
+                  <a:srgbClr val="3333CC"/>
+                </a:solidFill>
+              </a:rPr>
+              <a:t>   </a:t>
+            </a:r>
+            <a:r>
+              <a:rPr lang="en-US" sz="4000" dirty="0" smtClean="0"/>
+              <a:t>- easy using </a:t>
+            </a:r>
+            <a:r>
+              <a:rPr lang="en-US" sz="4000" dirty="0" err="1" smtClean="0"/>
+              <a:t>Pulverizer</a:t>
+            </a:r>
+            <a:r>
+              <a:rPr lang="en-US" sz="4000" dirty="0" smtClean="0"/>
+              <a:t> or Euler</a:t>
+            </a:r>
+          </a:p>
+        </p:txBody>
+      </p:sp>
+    </p:spTree>
+  </p:cSld>
+  <p:clrMapOvr>
+    <a:masterClrMapping/>
+  </p:clrMapOvr>
+  <p:transition>
+    <p:fade/>
+  </p:transition>
+  <p:timing>
+    <p:tnLst>
+      <p:par>
+        <p:cTn id="1" dur="indefinite" restart="never" nodeType="tmRoot">
+          <p:childTnLst>
+            <p:seq concurrent="1" nextAc="seek">
+              <p:cTn id="2" dur="indefinite" nodeType="mainSeq">
+                <p:childTnLst>
+                  <p:par>
+                    <p:cTn id="3" fill="hold">
+                      <p:stCondLst>
+                        <p:cond delay="indefinite"/>
+                      </p:stCondLst>
+                      <p:childTnLst>
+                        <p:par>
+                          <p:cTn id="4" fill="hold">
+                            <p:stCondLst>
+                              <p:cond delay="0"/>
+                            </p:stCondLst>
+                            <p:childTnLst>
+                              <p:par>
+                                <p:cTn id="5" presetID="1" presetClass="entr" presetSubtype="0" fill="hold" nodeType="clickEffect">
+                                  <p:stCondLst>
+                                    <p:cond delay="0"/>
+                                  </p:stCondLst>
+                                  <p:childTnLst>
+                                    <p:set>
+                                      <p:cBhvr>
+                                        <p:cTn id="6" dur="1" fill="hold">
+                                          <p:stCondLst>
+                                            <p:cond delay="0"/>
+                                          </p:stCondLst>
+                                        </p:cTn>
+                                        <p:tgtEl>
+                                          <p:spTgt spid="408579">
+                                            <p:txEl>
+                                              <p:pRg st="3" end="3"/>
+                                            </p:txEl>
+                                          </p:spTgt>
+                                        </p:tgtEl>
+                                        <p:attrNameLst>
+                                          <p:attrName>style.visibility</p:attrName>
+                                        </p:attrNameLst>
+                                      </p:cBhvr>
+                                      <p:to>
+                                        <p:strVal val="visible"/>
+                                      </p:to>
+                                    </p:set>
+                                  </p:childTnLst>
+                                </p:cTn>
+                              </p:par>
+                              <p:par>
+                                <p:cTn id="7" presetID="1" presetClass="entr" presetSubtype="0" fill="hold" nodeType="withEffect">
+                                  <p:stCondLst>
+                                    <p:cond delay="0"/>
+                                  </p:stCondLst>
+                                  <p:childTnLst>
+                                    <p:set>
+                                      <p:cBhvr>
+                                        <p:cTn id="8" dur="1" fill="hold">
+                                          <p:stCondLst>
+                                            <p:cond delay="0"/>
+                                          </p:stCondLst>
+                                        </p:cTn>
+                                        <p:tgtEl>
+                                          <p:spTgt spid="408579">
+                                            <p:txEl>
+                                              <p:pRg st="4" end="4"/>
+                                            </p:txEl>
+                                          </p:spTgt>
+                                        </p:tgtEl>
+                                        <p:attrNameLst>
+                                          <p:attrName>style.visibility</p:attrName>
+                                        </p:attrNameLst>
+                                      </p:cBhvr>
+                                      <p:to>
+                                        <p:strVal val="visible"/>
+                                      </p:to>
+                                    </p:set>
+                                  </p:childTnLst>
+                                </p:cTn>
+                              </p:par>
+                              <p:par>
+                                <p:cTn id="9" presetID="1" presetClass="entr" presetSubtype="0" fill="hold" nodeType="withEffect">
+                                  <p:stCondLst>
+                                    <p:cond delay="0"/>
+                                  </p:stCondLst>
+                                  <p:childTnLst>
+                                    <p:set>
+                                      <p:cBhvr>
+                                        <p:cTn id="10" dur="1" fill="hold">
+                                          <p:stCondLst>
+                                            <p:cond delay="0"/>
+                                          </p:stCondLst>
+                                        </p:cTn>
+                                        <p:tgtEl>
+                                          <p:spTgt spid="408579">
+                                            <p:txEl>
+                                              <p:pRg st="5" end="5"/>
+                                            </p:txEl>
+                                          </p:spTgt>
+                                        </p:tgtEl>
+                                        <p:attrNameLst>
+                                          <p:attrName>style.visibility</p:attrName>
+                                        </p:attrNameLst>
+                                      </p:cBhvr>
+                                      <p:to>
+                                        <p:strVal val="visible"/>
+                                      </p:to>
+                                    </p:set>
+                                  </p:childTnLst>
+                                </p:cTn>
+                              </p:par>
+                            </p:childTnLst>
+                          </p:cTn>
+                        </p:par>
+                      </p:childTnLst>
+                    </p:cTn>
+                  </p:par>
+                  <p:par>
+                    <p:cTn id="11" fill="hold">
+                      <p:stCondLst>
+                        <p:cond delay="indefinite"/>
+                      </p:stCondLst>
+                      <p:childTnLst>
+                        <p:par>
+                          <p:cTn id="12" fill="hold">
+                            <p:stCondLst>
+                              <p:cond delay="0"/>
+                            </p:stCondLst>
+                            <p:childTnLst>
+                              <p:par>
+                                <p:cTn id="13" presetID="1" presetClass="entr" presetSubtype="0" fill="hold" nodeType="clickEffect">
+                                  <p:stCondLst>
+                                    <p:cond delay="0"/>
+                                  </p:stCondLst>
+                                  <p:childTnLst>
+                                    <p:set>
+                                      <p:cBhvr>
+                                        <p:cTn id="14" dur="1" fill="hold">
+                                          <p:stCondLst>
+                                            <p:cond delay="0"/>
+                                          </p:stCondLst>
+                                        </p:cTn>
+                                        <p:tgtEl>
+                                          <p:spTgt spid="408579">
+                                            <p:txEl>
+                                              <p:pRg st="6" end="6"/>
+                                            </p:txEl>
+                                          </p:spTgt>
+                                        </p:tgtEl>
+                                        <p:attrNameLst>
+                                          <p:attrName>style.visibility</p:attrName>
+                                        </p:attrNameLst>
+                                      </p:cBhvr>
+                                      <p:to>
+                                        <p:strVal val="visible"/>
+                                      </p:to>
+                                    </p:set>
+                                  </p:childTnLst>
+                                </p:cTn>
+                              </p:par>
+                              <p:par>
+                                <p:cTn id="15" presetID="1" presetClass="entr" presetSubtype="0" fill="hold" nodeType="withEffect">
+                                  <p:stCondLst>
+                                    <p:cond delay="0"/>
+                                  </p:stCondLst>
+                                  <p:childTnLst>
+                                    <p:set>
+                                      <p:cBhvr>
+                                        <p:cTn id="16" dur="1" fill="hold">
+                                          <p:stCondLst>
+                                            <p:cond delay="0"/>
+                                          </p:stCondLst>
+                                        </p:cTn>
+                                        <p:tgtEl>
+                                          <p:spTgt spid="408579">
+                                            <p:txEl>
+                                              <p:pRg st="7" end="7"/>
+                                            </p:txEl>
+                                          </p:spTgt>
+                                        </p:tgtEl>
+                                        <p:attrNameLst>
+                                          <p:attrName>style.visibility</p:attrName>
+                                        </p:attrNameLst>
+                                      </p:cBhvr>
+                                      <p:to>
+                                        <p:strVal val="visible"/>
+                                      </p:to>
+                                    </p:set>
+                                  </p:childTnLst>
+                                </p:cTn>
+                              </p:par>
+                            </p:childTnLst>
+                          </p:cTn>
+                        </p:par>
+                      </p:childTnLst>
+                    </p:cTn>
+                  </p:par>
+                </p:childTnLst>
+              </p:cTn>
+              <p:prevCondLst>
+                <p:cond evt="onPrev" delay="0">
+                  <p:tgtEl>
+                    <p:sldTgt/>
+                  </p:tgtEl>
+                </p:cond>
+              </p:prevCondLst>
+              <p:nextCondLst>
+                <p:cond evt="onNext" delay="0">
+                  <p:tgtEl>
+                    <p:sldTgt/>
+                  </p:tgtEl>
+                </p:cond>
+              </p:nextCondLst>
+            </p:seq>
+          </p:childTnLst>
+        </p:cTn>
+      </p:par>
+    </p:tnLst>
+  </p:timing>
+</p:sld>
+</file>
+
+<file path=ppt/slides/slide31.xml><?xml version="1.0" encoding="utf-8"?>
+<p:sld xmlns:a="http://schemas.openxmlformats.org/drawingml/2006/main" xmlns:r="http://schemas.openxmlformats.org/officeDocument/2006/relationships" xmlns:mc="http://schemas.openxmlformats.org/markup-compatibility/2006" xmlns:mv="urn:schemas-microsoft-com:mac:vml" xmlns:p="http://schemas.openxmlformats.org/presentationml/2006/main" mc:Ignorable="mv" mc:PreserveAttributes="mv:*" show="0">
+  <p:cSld>
+    <p:spTree>
+      <p:nvGrpSpPr>
+        <p:cNvPr id="1" name=""/>
+        <p:cNvGrpSpPr/>
+        <p:nvPr/>
+      </p:nvGrpSpPr>
+      <p:grpSpPr>
+        <a:xfrm>
+          <a:off x="0" y="0"/>
+          <a:ext cx="0" cy="0"/>
+          <a:chOff x="0" y="0"/>
+          <a:chExt cx="0" cy="0"/>
+        </a:xfrm>
+      </p:grpSpPr>
+      <p:sp>
+        <p:nvSpPr>
+          <p:cNvPr id="4" name="Slide Number Placeholder 3"/>
+          <p:cNvSpPr>
+            <a:spLocks noGrp="1"/>
+          </p:cNvSpPr>
+          <p:nvPr>
+            <p:ph type="sldNum" sz="quarter" idx="4"/>
+          </p:nvPr>
+        </p:nvSpPr>
+        <p:spPr>
+          <a:xfrm>
+            <a:off x="6477000" y="6553200"/>
+            <a:ext cx="2667000" cy="307777"/>
+          </a:xfrm>
+        </p:spPr>
+        <p:txBody>
+          <a:bodyPr/>
+          <a:lstStyle/>
+          <a:p>
+            <a:pPr>
+              <a:defRPr/>
+            </a:pPr>
+            <a:r>
+              <a:rPr lang="en-US" dirty="0" err="1" smtClean="0"/>
+              <a:t>lec</a:t>
+            </a:r>
+            <a:r>
+              <a:rPr lang="en-US" dirty="0" smtClean="0"/>
+              <a:t> 5F.</a:t>
+            </a:r>
             <a:fld id="{F389C0C6-D6B8-4BCF-9EE6-7CFCBB0EDCA3}" type="slidenum">
               <a:rPr lang="en-US" smtClean="0"/>
               <a:pPr>
                 <a:defRPr/>
               </a:pPr>
-              <a:t>30</a:t>
+              <a:t>31</a:t>
             </a:fld>
             <a:endParaRPr lang="en-US" dirty="0"/>
           </a:p>
@@ -20015,7 +20518,7 @@
 </p:sld>
 </file>
 
-<file path=ppt/slides/slide31.xml><?xml version="1.0" encoding="utf-8"?>
+<file path=ppt/slides/slide32.xml><?xml version="1.0" encoding="utf-8"?>
 <p:sld xmlns:a="http://schemas.openxmlformats.org/drawingml/2006/main" xmlns:r="http://schemas.openxmlformats.org/officeDocument/2006/relationships" xmlns:mc="http://schemas.openxmlformats.org/markup-compatibility/2006" xmlns:mv="urn:schemas-microsoft-com:mac:vml" xmlns:p="http://schemas.openxmlformats.org/presentationml/2006/main" mc:Ignorable="mv" mc:PreserveAttributes="mv:*">
   <p:cSld>
     <p:spTree>
@@ -20085,13 +20588,21 @@
             <a:pPr algn="ctr" eaLnBrk="1" hangingPunct="1"/>
             <a:r>
               <a:rPr lang="en-US" sz="12700" dirty="0" smtClean="0"/>
-              <a:t>1 </a:t>
+              <a:t>1</a:t>
+            </a:r>
+            <a:r>
+              <a:rPr lang="en-US" sz="12700" dirty="0" smtClean="0">
+                <a:latin typeface="Euclid Symbol" charset="2"/>
+                <a:cs typeface="Euclid Symbol" charset="2"/>
+                <a:sym typeface="Euclid Symbol" pitchFamily="18" charset="2"/>
+              </a:rPr>
+              <a:t>-</a:t>
             </a:r>
             <a:r>
               <a:rPr lang="en-US" sz="12700" dirty="0" smtClean="0">
                 <a:sym typeface="Euclid Symbol" pitchFamily="18" charset="2"/>
               </a:rPr>
-              <a:t>&amp; 2</a:t>
+              <a:t>4</a:t>
             </a:r>
             <a:endParaRPr lang="en-US" sz="12700" dirty="0"/>
           </a:p>
@@ -20133,7 +20644,7 @@
               <a:pPr>
                 <a:defRPr/>
               </a:pPr>
-              <a:t>31</a:t>
+              <a:t>32</a:t>
             </a:fld>
             <a:endParaRPr lang="en-US" dirty="0"/>
           </a:p>
@@ -20144,7 +20655,9 @@
   <p:clrMapOvr>
     <a:masterClrMapping/>
   </p:clrMapOvr>
-  <p:transition/>
+  <p:transition spd="slow">
+    <p:fade thruBlk="1"/>
+  </p:transition>
   <p:timing>
     <p:tnLst>
       <p:par>
@@ -20155,7 +20668,7 @@
 </p:sld>
 </file>
 
-<file path=ppt/slides/slide32.xml><?xml version="1.0" encoding="utf-8"?>
+<file path=ppt/slides/slide33.xml><?xml version="1.0" encoding="utf-8"?>
 <p:sld xmlns:a="http://schemas.openxmlformats.org/drawingml/2006/main" xmlns:r="http://schemas.openxmlformats.org/officeDocument/2006/relationships" xmlns:mc="http://schemas.openxmlformats.org/markup-compatibility/2006" xmlns:mv="urn:schemas-microsoft-com:mac:vml" xmlns:p="http://schemas.openxmlformats.org/presentationml/2006/main" mc:Ignorable="mv" mc:PreserveAttributes="mv:*" show="0">
   <p:cSld>
     <p:spTree>
@@ -20449,10 +20962,10 @@
                 <a:latin typeface="Comic Sans MS"/>
                 <a:cs typeface="Comic Sans MS"/>
               </a:rPr>
-              <a:t> </a:t>
-            </a:r>
-            <a:r>
-              <a:rPr lang="en-US" sz="4800" dirty="0" smtClean="0">
+              <a:t> (mod </a:t>
+            </a:r>
+            <a:r>
+              <a:rPr lang="en-US" sz="4800" dirty="0" err="1" smtClean="0">
                 <a:solidFill>
                   <a:schemeClr val="accent1">
                     <a:lumMod val="50000"/>
@@ -20461,10 +20974,10 @@
                 <a:latin typeface="Comic Sans MS"/>
                 <a:cs typeface="Comic Sans MS"/>
               </a:rPr>
-              <a:t>(mod </a:t>
-            </a:r>
-            <a:r>
-              <a:rPr lang="en-US" sz="4800" dirty="0" err="1" smtClean="0">
+              <a:t>n</a:t>
+            </a:r>
+            <a:r>
+              <a:rPr lang="en-US" sz="4800" dirty="0" smtClean="0">
                 <a:solidFill>
                   <a:schemeClr val="accent1">
                     <a:lumMod val="50000"/>
@@ -20473,32 +20986,32 @@
                 <a:latin typeface="Comic Sans MS"/>
                 <a:cs typeface="Comic Sans MS"/>
               </a:rPr>
-              <a:t>n</a:t>
+              <a:t>) </a:t>
             </a:r>
             <a:r>
               <a:rPr lang="en-US" sz="4800" dirty="0" smtClean="0">
                 <a:solidFill>
-                  <a:schemeClr val="accent1">
-                    <a:lumMod val="50000"/>
-                  </a:schemeClr>
+                  <a:srgbClr val="000000"/>
                 </a:solidFill>
                 <a:latin typeface="Comic Sans MS"/>
                 <a:cs typeface="Comic Sans MS"/>
               </a:rPr>
-              <a:t>) </a:t>
+              <a:t>because</a:t>
             </a:r>
             <a:r>
               <a:rPr lang="en-US" sz="4800" dirty="0" smtClean="0">
                 <a:solidFill>
-                  <a:srgbClr val="000000"/>
+                  <a:schemeClr val="accent1">
+                    <a:lumMod val="50000"/>
+                  </a:schemeClr>
                 </a:solidFill>
                 <a:latin typeface="Comic Sans MS"/>
                 <a:cs typeface="Comic Sans MS"/>
               </a:rPr>
-              <a:t>because</a:t>
-            </a:r>
-            <a:r>
-              <a:rPr lang="en-US" sz="4800" dirty="0" smtClean="0">
+              <a:t> </a:t>
+            </a:r>
+            <a:r>
+              <a:rPr lang="en-US" sz="4800" dirty="0" err="1" smtClean="0">
                 <a:solidFill>
                   <a:schemeClr val="accent1">
                     <a:lumMod val="50000"/>
@@ -20507,10 +21020,10 @@
                 <a:latin typeface="Comic Sans MS"/>
                 <a:cs typeface="Comic Sans MS"/>
               </a:rPr>
-              <a:t> </a:t>
-            </a:r>
-            <a:r>
-              <a:rPr lang="en-US" sz="4800" dirty="0" err="1" smtClean="0">
+              <a:t>k</a:t>
+            </a:r>
+            <a:r>
+              <a:rPr lang="en-US" sz="4800" dirty="0" smtClean="0">
                 <a:solidFill>
                   <a:schemeClr val="accent1">
                     <a:lumMod val="50000"/>
@@ -20519,51 +21032,30 @@
                 <a:latin typeface="Comic Sans MS"/>
                 <a:cs typeface="Comic Sans MS"/>
               </a:rPr>
-              <a:t>k</a:t>
+              <a:t> </a:t>
             </a:r>
             <a:r>
               <a:rPr lang="en-US" sz="4800" dirty="0" smtClean="0">
                 <a:solidFill>
-                  <a:schemeClr val="accent1">
-                    <a:lumMod val="50000"/>
-                  </a:schemeClr>
+                  <a:srgbClr val="000000"/>
                 </a:solidFill>
                 <a:latin typeface="Comic Sans MS"/>
                 <a:cs typeface="Comic Sans MS"/>
               </a:rPr>
-              <a:t> </a:t>
+              <a:t>cancels</a:t>
             </a:r>
             <a:r>
               <a:rPr lang="en-US" sz="4800" dirty="0" smtClean="0">
                 <a:solidFill>
-                  <a:srgbClr val="000000"/>
+                  <a:schemeClr val="accent1">
+                    <a:lumMod val="50000"/>
+                  </a:schemeClr>
                 </a:solidFill>
                 <a:latin typeface="Comic Sans MS"/>
                 <a:cs typeface="Comic Sans MS"/>
               </a:rPr>
-              <a:t>cancels</a:t>
-            </a:r>
-            <a:r>
-              <a:rPr lang="en-US" sz="4800" dirty="0" smtClean="0">
-                <a:solidFill>
-                  <a:schemeClr val="accent1">
-                    <a:lumMod val="50000"/>
-                  </a:schemeClr>
-                </a:solidFill>
-                <a:latin typeface="Comic Sans MS"/>
-                <a:cs typeface="Comic Sans MS"/>
-              </a:rPr>
               <a:t> </a:t>
             </a:r>
-            <a:endParaRPr lang="en-US" sz="4800" dirty="0" smtClean="0">
-              <a:solidFill>
-                <a:schemeClr val="accent1">
-                  <a:lumMod val="50000"/>
-                </a:schemeClr>
-              </a:solidFill>
-              <a:latin typeface="Comic Sans MS"/>
-              <a:cs typeface="Comic Sans MS"/>
-            </a:endParaRPr>
           </a:p>
           <a:p>
             <a:pPr>
@@ -20574,14 +21066,55 @@
                 <a:latin typeface="Comic Sans MS" pitchFamily="66" charset="0"/>
                 <a:sym typeface="Euclid Symbol" pitchFamily="18" charset="2"/>
               </a:rPr>
-              <a:t>so neither </a:t>
+              <a:t>so neither are </a:t>
+            </a:r>
+            <a:r>
+              <a:rPr lang="en-US" sz="4800" dirty="0" err="1" smtClean="0">
+                <a:solidFill>
+                  <a:schemeClr val="accent5">
+                    <a:lumMod val="50000"/>
+                  </a:schemeClr>
+                </a:solidFill>
+                <a:latin typeface="Comic Sans MS" pitchFamily="66" charset="0"/>
+                <a:sym typeface="Euclid Symbol" pitchFamily="18" charset="2"/>
+              </a:rPr>
+              <a:t>rem(m</a:t>
+            </a:r>
+            <a:r>
+              <a:rPr lang="en-US" sz="4800" baseline="-25000" dirty="0" err="1" smtClean="0">
+                <a:solidFill>
+                  <a:schemeClr val="accent5">
+                    <a:lumMod val="50000"/>
+                  </a:schemeClr>
+                </a:solidFill>
+                <a:latin typeface="Comic Sans MS" pitchFamily="66" charset="0"/>
+                <a:sym typeface="Euclid Symbol" pitchFamily="18" charset="2"/>
+              </a:rPr>
+              <a:t>i</a:t>
+            </a:r>
+            <a:r>
+              <a:rPr lang="en-US" sz="4800" dirty="0" err="1" smtClean="0">
+                <a:solidFill>
+                  <a:schemeClr val="accent5">
+                    <a:lumMod val="50000"/>
+                  </a:schemeClr>
+                </a:solidFill>
+                <a:latin typeface="Comic Sans MS" pitchFamily="66" charset="0"/>
+                <a:sym typeface="Euclid Symbol" pitchFamily="18" charset="2"/>
+              </a:rPr>
+              <a:t>k</a:t>
             </a:r>
             <a:r>
               <a:rPr lang="en-US" sz="4800" dirty="0" smtClean="0">
+                <a:solidFill>
+                  <a:schemeClr val="accent5">
+                    <a:lumMod val="50000"/>
+                  </a:schemeClr>
+                </a:solidFill>
                 <a:latin typeface="Comic Sans MS" pitchFamily="66" charset="0"/>
                 <a:sym typeface="Euclid Symbol" pitchFamily="18" charset="2"/>
               </a:rPr>
-              <a:t>are </a:t>
+              <a:t>, </a:t>
             </a:r>
             <a:r>
               <a:rPr lang="en-US" sz="4800" dirty="0" err="1" smtClean="0">
@@ -20593,10 +21126,10 @@
                 <a:latin typeface="Comic Sans MS" pitchFamily="66" charset="0"/>
                 <a:sym typeface="Euclid Symbol" pitchFamily="18" charset="2"/>
               </a:rPr>
-              <a:t>rem(m</a:t>
-            </a:r>
-            <a:r>
-              <a:rPr lang="en-US" sz="4800" baseline="-25000" dirty="0" err="1" smtClean="0">
+              <a:t>n</a:t>
+            </a:r>
+            <a:r>
+              <a:rPr lang="en-US" sz="4800" dirty="0" smtClean="0">
                 <a:solidFill>
                   <a:schemeClr val="accent5">
                     <a:lumMod val="50000"/>
@@ -20605,65 +21138,8 @@
                 <a:latin typeface="Comic Sans MS" pitchFamily="66" charset="0"/>
                 <a:sym typeface="Euclid Symbol" pitchFamily="18" charset="2"/>
               </a:rPr>
-              <a:t>i</a:t>
-            </a:r>
-            <a:r>
-              <a:rPr lang="en-US" sz="4800" dirty="0" err="1" smtClean="0">
-                <a:solidFill>
-                  <a:schemeClr val="accent5">
-                    <a:lumMod val="50000"/>
-                  </a:schemeClr>
-                </a:solidFill>
-                <a:latin typeface="Comic Sans MS" pitchFamily="66" charset="0"/>
-                <a:sym typeface="Euclid Symbol" pitchFamily="18" charset="2"/>
-              </a:rPr>
-              <a:t>k</a:t>
-            </a:r>
-            <a:r>
-              <a:rPr lang="en-US" sz="4800" dirty="0" smtClean="0">
-                <a:solidFill>
-                  <a:schemeClr val="accent5">
-                    <a:lumMod val="50000"/>
-                  </a:schemeClr>
-                </a:solidFill>
-                <a:latin typeface="Comic Sans MS" pitchFamily="66" charset="0"/>
-                <a:sym typeface="Euclid Symbol" pitchFamily="18" charset="2"/>
-              </a:rPr>
-              <a:t>, </a:t>
-            </a:r>
-            <a:r>
-              <a:rPr lang="en-US" sz="4800" dirty="0" err="1" smtClean="0">
-                <a:solidFill>
-                  <a:schemeClr val="accent5">
-                    <a:lumMod val="50000"/>
-                  </a:schemeClr>
-                </a:solidFill>
-                <a:latin typeface="Comic Sans MS" pitchFamily="66" charset="0"/>
-                <a:sym typeface="Euclid Symbol" pitchFamily="18" charset="2"/>
-              </a:rPr>
-              <a:t>n</a:t>
-            </a:r>
-            <a:r>
-              <a:rPr lang="en-US" sz="4800" dirty="0" smtClean="0">
-                <a:solidFill>
-                  <a:schemeClr val="accent5">
-                    <a:lumMod val="50000"/>
-                  </a:schemeClr>
-                </a:solidFill>
-                <a:latin typeface="Comic Sans MS" pitchFamily="66" charset="0"/>
-                <a:sym typeface="Euclid Symbol" pitchFamily="18" charset="2"/>
-              </a:rPr>
               <a:t>)</a:t>
             </a:r>
-            <a:endParaRPr lang="en-US" sz="4800" dirty="0" smtClean="0">
-              <a:solidFill>
-                <a:schemeClr val="accent5">
-                  <a:lumMod val="50000"/>
-                </a:schemeClr>
-              </a:solidFill>
-              <a:latin typeface="Comic Sans MS" pitchFamily="66" charset="0"/>
-              <a:sym typeface="Euclid Symbol" pitchFamily="18" charset="2"/>
-            </a:endParaRPr>
           </a:p>
           <a:p>
             <a:pPr>
@@ -20687,17 +21163,7 @@
                 <a:latin typeface="Comic Sans MS" pitchFamily="66" charset="0"/>
                 <a:sym typeface="Euclid Symbol" pitchFamily="18" charset="2"/>
               </a:rPr>
-              <a:t>       </a:t>
-            </a:r>
-            <a:r>
-              <a:rPr lang="en-US" sz="5400" dirty="0" smtClean="0">
-                <a:solidFill>
-                  <a:srgbClr val="000000"/>
-                </a:solidFill>
-                <a:latin typeface="Comic Sans MS" pitchFamily="66" charset="0"/>
-                <a:sym typeface="Euclid Symbol" pitchFamily="18" charset="2"/>
-              </a:rPr>
-              <a:t> </a:t>
+              <a:t>        </a:t>
             </a:r>
             <a:r>
               <a:rPr lang="en-US" sz="4800" dirty="0" smtClean="0">
@@ -20832,15 +21298,7 @@
                 <a:cs typeface="Comic Sans MS"/>
                 <a:sym typeface="Euclid Symbol" pitchFamily="18" charset="2"/>
               </a:rPr>
-              <a:t>so </a:t>
-            </a:r>
-            <a:r>
-              <a:rPr lang="en-US" sz="4800" dirty="0" smtClean="0">
-                <a:latin typeface="Comic Sans MS"/>
-                <a:cs typeface="Comic Sans MS"/>
-                <a:sym typeface="Euclid Symbol" pitchFamily="18" charset="2"/>
-              </a:rPr>
-              <a:t>each one is different.</a:t>
+              <a:t>so each one is different.</a:t>
             </a:r>
           </a:p>
           <a:p>
@@ -21618,7 +22076,7 @@
 </p:sld>
 </file>
 
-<file path=ppt/slides/slide33.xml><?xml version="1.0" encoding="utf-8"?>
+<file path=ppt/slides/slide34.xml><?xml version="1.0" encoding="utf-8"?>
 <p:sld xmlns:a="http://schemas.openxmlformats.org/drawingml/2006/main" xmlns:r="http://schemas.openxmlformats.org/officeDocument/2006/relationships" xmlns:mc="http://schemas.openxmlformats.org/markup-compatibility/2006" xmlns:mv="urn:schemas-microsoft-com:mac:vml" xmlns:p="http://schemas.openxmlformats.org/presentationml/2006/main" mc:Ignorable="mv" mc:PreserveAttributes="mv:*" show="0">
   <p:cSld>
     <p:spTree>
@@ -21671,7 +22129,7 @@
               <a:pPr>
                 <a:defRPr/>
               </a:pPr>
-              <a:t>33</a:t>
+              <a:t>34</a:t>
             </a:fld>
             <a:endParaRPr lang="en-US" dirty="0"/>
           </a:p>
@@ -22976,8 +23434,8 @@
         </p:nvSpPr>
         <p:spPr bwMode="auto">
           <a:xfrm>
-            <a:off x="546100" y="1770063"/>
-            <a:ext cx="8112125" cy="1555750"/>
+            <a:off x="457200" y="1770063"/>
+            <a:ext cx="8187946" cy="1768176"/>
           </a:xfrm>
           <a:prstGeom prst="rect">
             <a:avLst/>
@@ -23005,13 +23463,13 @@
               </a:spcBef>
             </a:pPr>
             <a:r>
-              <a:rPr lang="en-US" sz="4800">
+              <a:rPr lang="en-US" sz="5400" dirty="0">
                 <a:latin typeface="Comic Sans MS" pitchFamily="66" charset="0"/>
               </a:rPr>
               <a:t>If </a:t>
             </a:r>
             <a:r>
-              <a:rPr lang="en-US" sz="4800">
+              <a:rPr lang="en-US" sz="5400" dirty="0" err="1">
                 <a:solidFill>
                   <a:srgbClr val="3333CC"/>
                 </a:solidFill>
@@ -23020,20 +23478,26 @@
               <a:t>p</a:t>
             </a:r>
             <a:r>
-              <a:rPr lang="en-US" sz="4800">
+              <a:rPr lang="en-US" sz="5400" dirty="0">
                 <a:latin typeface="Comic Sans MS" pitchFamily="66" charset="0"/>
               </a:rPr>
               <a:t> prime,</a:t>
             </a:r>
             <a:r>
-              <a:rPr lang="en-US"/>
+              <a:rPr lang="en-US" sz="4800" dirty="0"/>
               <a:t> </a:t>
             </a:r>
             <a:r>
-              <a:rPr lang="en-US" sz="4800">
-                <a:latin typeface="Comic Sans MS" pitchFamily="66" charset="0"/>
-              </a:rPr>
-              <a:t>everything from</a:t>
+              <a:rPr lang="en-US" sz="5400" dirty="0">
+                <a:latin typeface="Comic Sans MS" pitchFamily="66" charset="0"/>
+              </a:rPr>
+              <a:t>everything</a:t>
+            </a:r>
+            <a:r>
+              <a:rPr lang="en-US" sz="5400" dirty="0" smtClean="0">
+                <a:latin typeface="Comic Sans MS" pitchFamily="66" charset="0"/>
+              </a:rPr>
+              <a:t> in</a:t>
             </a:r>
           </a:p>
           <a:p>
@@ -23046,46 +23510,31 @@
               </a:spcBef>
             </a:pPr>
             <a:r>
-              <a:rPr lang="en-US" sz="4800">
+              <a:rPr lang="en-US" sz="5400" dirty="0" smtClean="0">
                 <a:solidFill>
                   <a:srgbClr val="3333CC"/>
                 </a:solidFill>
                 <a:latin typeface="Comic Sans MS" pitchFamily="66" charset="0"/>
               </a:rPr>
-              <a:t>1</a:t>
-            </a:r>
-            <a:r>
-              <a:rPr lang="en-US" sz="4800">
-                <a:latin typeface="Comic Sans MS" pitchFamily="66" charset="0"/>
-              </a:rPr>
-              <a:t> to </a:t>
-            </a:r>
-            <a:r>
-              <a:rPr lang="en-US" sz="4800">
+              <a:t>[1,p) </a:t>
+            </a:r>
+            <a:r>
+              <a:rPr lang="en-US" sz="5400" dirty="0">
+                <a:latin typeface="Comic Sans MS" pitchFamily="66" charset="0"/>
+              </a:rPr>
+              <a:t>is rel. prime to </a:t>
+            </a:r>
+            <a:r>
+              <a:rPr lang="en-US" sz="5400" dirty="0" err="1">
                 <a:solidFill>
                   <a:srgbClr val="3333CC"/>
                 </a:solidFill>
                 <a:latin typeface="Comic Sans MS" pitchFamily="66" charset="0"/>
               </a:rPr>
-              <a:t>p-1 </a:t>
-            </a:r>
-            <a:r>
-              <a:rPr lang="en-US" sz="4800">
-                <a:latin typeface="Comic Sans MS" pitchFamily="66" charset="0"/>
-              </a:rPr>
-              <a:t>is rel. prime to </a:t>
-            </a:r>
-            <a:r>
-              <a:rPr lang="en-US" sz="4800">
-                <a:solidFill>
-                  <a:srgbClr val="3333CC"/>
-                </a:solidFill>
-                <a:latin typeface="Comic Sans MS" pitchFamily="66" charset="0"/>
-              </a:rPr>
               <a:t>p</a:t>
             </a:r>
             <a:r>
-              <a:rPr lang="en-US" sz="4800">
+              <a:rPr lang="en-US" sz="5400" dirty="0">
                 <a:latin typeface="Comic Sans MS" pitchFamily="66" charset="0"/>
               </a:rPr>
               <a:t>, so</a:t>
@@ -23867,7 +24316,7 @@
     <a:masterClrMapping/>
   </p:clrMapOvr>
   <p:transition>
-    <p:fade/>
+    <p:fade thruBlk="1"/>
   </p:transition>
   <p:timing>
     <p:tnLst>
@@ -23890,7 +24339,7 @@
                             </p:stCondLst>
                             <p:childTnLst>
                               <p:par>
-                                <p:cTn id="5" presetID="1" presetClass="entr" presetSubtype="0" fill="hold" grpId="0" nodeType="clickEffect">
+                                <p:cTn id="5" presetID="22" presetClass="entr" presetSubtype="8" fill="hold" grpId="0" nodeType="clickEffect">
                                   <p:stCondLst>
                                     <p:cond delay="0"/>
                                   </p:stCondLst>
@@ -23913,6 +24362,14 @@
                                         <p:strVal val="visible"/>
                                       </p:to>
                                     </p:set>
+                                    <p:animEffect transition="in" filter="wipe(left)">
+                                      <p:cBhvr>
+                                        <p:cTn id="7" dur="500"/>
+                                        <p:tgtEl>
+                                          <p:spTgt spid="7"/>
+                                        </p:tgtEl>
+                                      </p:cBhvr>
+                                    </p:animEffect>
                                   </p:childTnLst>
                                 </p:cTn>
                               </p:par>
@@ -23923,26 +24380,26 @@
                     </p:cTn>
                   </p:par>
                   <p:par>
-                    <p:cTn id="7" fill="hold">
+                    <p:cTn id="8" fill="hold">
                       <p:stCondLst>
                         <p:cond delay="indefinite"/>
                       </p:stCondLst>
                       <p:childTnLst>
                         <p:par>
-                          <p:cTn id="8" fill="hold">
+                          <p:cTn id="9" fill="hold">
                             <p:stCondLst>
                               <p:cond delay="0"/>
                             </p:stCondLst>
                             <p:childTnLst>
                               <p:par>
-                                <p:cTn id="9" presetID="1" presetClass="entr" presetSubtype="0" fill="hold" grpId="0" nodeType="clickEffect">
+                                <p:cTn id="10" presetID="9" presetClass="entr" presetSubtype="0" fill="hold" grpId="0" nodeType="clickEffect">
                                   <p:stCondLst>
                                     <p:cond delay="0"/>
                                   </p:stCondLst>
                                   <p:childTnLst>
                                     <p:set>
                                       <p:cBhvr>
-                                        <p:cTn id="10" dur="1" fill="hold">
+                                        <p:cTn id="11" dur="1" fill="hold">
                                           <p:stCondLst>
                                             <p:cond delay="0"/>
                                           </p:stCondLst>
@@ -23962,18 +24419,39 @@
                                         <p:strVal val="visible"/>
                                       </p:to>
                                     </p:set>
+                                    <p:animEffect transition="in" filter="dissolve">
+                                      <p:cBhvr>
+                                        <p:cTn id="12" dur="500"/>
+                                        <p:tgtEl>
+                                          <p:spTgt spid="25606">
+                                            <p:txEl>
+                                              <p:pRg st="0" end="0"/>
+                                            </p:txEl>
+                                          </p:spTgt>
+                                        </p:tgtEl>
+                                      </p:cBhvr>
+                                    </p:animEffect>
                                   </p:childTnLst>
                                 </p:cTn>
                               </p:par>
+                            </p:childTnLst>
+                          </p:cTn>
+                        </p:par>
+                        <p:par>
+                          <p:cTn id="13" fill="hold">
+                            <p:stCondLst>
+                              <p:cond delay="500"/>
+                            </p:stCondLst>
+                            <p:childTnLst>
                               <p:par>
-                                <p:cTn id="11" presetID="1" presetClass="entr" presetSubtype="0" fill="hold" grpId="0" nodeType="withEffect">
+                                <p:cTn id="14" presetID="9" presetClass="entr" presetSubtype="0" fill="hold" grpId="0" nodeType="afterEffect">
                                   <p:stCondLst>
                                     <p:cond delay="0"/>
                                   </p:stCondLst>
                                   <p:childTnLst>
                                     <p:set>
                                       <p:cBhvr>
-                                        <p:cTn id="12" dur="1" fill="hold">
+                                        <p:cTn id="15" dur="1" fill="hold">
                                           <p:stCondLst>
                                             <p:cond delay="0"/>
                                           </p:stCondLst>
@@ -23993,55 +24471,18 @@
                                         <p:strVal val="visible"/>
                                       </p:to>
                                     </p:set>
-                                  </p:childTnLst>
-                                </p:cTn>
-                              </p:par>
-                            </p:childTnLst>
-                          </p:cTn>
-                        </p:par>
-                      </p:childTnLst>
-                    </p:cTn>
-                  </p:par>
-                  <p:par>
-                    <p:cTn id="13" fill="hold">
-                      <p:stCondLst>
-                        <p:cond delay="indefinite"/>
-                      </p:stCondLst>
-                      <p:childTnLst>
-                        <p:par>
-                          <p:cTn id="14" fill="hold">
-                            <p:stCondLst>
-                              <p:cond delay="0"/>
-                            </p:stCondLst>
-                            <p:childTnLst>
-                              <p:par>
-                                <p:cTn id="15" presetID="1" presetClass="entr" presetSubtype="0" fill="hold" grpId="0" nodeType="clickEffect">
-                                  <p:stCondLst>
-                                    <p:cond delay="0"/>
-                                  </p:stCondLst>
-                                  <p:childTnLst>
-                                    <p:set>
+                                    <p:animEffect transition="in" filter="dissolve">
                                       <p:cBhvr>
-                                        <p:cTn id="16" dur="1" fill="hold">
-                                          <p:stCondLst>
-                                            <p:cond delay="0"/>
-                                          </p:stCondLst>
-                                        </p:cTn>
+                                        <p:cTn id="16" dur="500"/>
                                         <p:tgtEl>
                                           <p:spTgt spid="25606">
                                             <p:txEl>
-                                              <p:pRg st="2" end="2"/>
+                                              <p:pRg st="1" end="1"/>
                                             </p:txEl>
                                           </p:spTgt>
                                         </p:tgtEl>
-                                        <p:attrNameLst>
-                                          <p:attrName>style.visibility</p:attrName>
-                                        </p:attrNameLst>
                                       </p:cBhvr>
-                                      <p:to>
-                                        <p:strVal val="visible"/>
-                                      </p:to>
-                                    </p:set>
+                                    </p:animEffect>
                                   </p:childTnLst>
                                 </p:cTn>
                               </p:par>
@@ -24064,7 +24505,7 @@
                             </p:stCondLst>
                             <p:childTnLst>
                               <p:par>
-                                <p:cTn id="19" presetID="22" presetClass="entr" presetSubtype="8" fill="hold" grpId="0" nodeType="clickEffect">
+                                <p:cTn id="19" presetID="9" presetClass="entr" presetSubtype="0" fill="hold" grpId="0" nodeType="clickEffect">
                                   <p:stCondLst>
                                     <p:cond delay="0"/>
                                   </p:stCondLst>
@@ -24077,7 +24518,11 @@
                                           </p:stCondLst>
                                         </p:cTn>
                                         <p:tgtEl>
-                                          <p:spTgt spid="8"/>
+                                          <p:spTgt spid="25606">
+                                            <p:txEl>
+                                              <p:pRg st="2" end="2"/>
+                                            </p:txEl>
+                                          </p:spTgt>
                                         </p:tgtEl>
                                         <p:attrNameLst>
                                           <p:attrName>style.visibility</p:attrName>
@@ -24087,11 +24532,15 @@
                                         <p:strVal val="visible"/>
                                       </p:to>
                                     </p:set>
-                                    <p:animEffect transition="in" filter="wipe(left)">
+                                    <p:animEffect transition="in" filter="dissolve">
                                       <p:cBhvr>
-                                        <p:cTn id="21" dur="2000"/>
+                                        <p:cTn id="21" dur="500"/>
                                         <p:tgtEl>
-                                          <p:spTgt spid="8"/>
+                                          <p:spTgt spid="25606">
+                                            <p:txEl>
+                                              <p:pRg st="2" end="2"/>
+                                            </p:txEl>
+                                          </p:spTgt>
                                         </p:tgtEl>
                                       </p:cBhvr>
                                     </p:animEffect>
@@ -24117,7 +24566,7 @@
                             </p:stCondLst>
                             <p:childTnLst>
                               <p:par>
-                                <p:cTn id="24" presetID="1" presetClass="entr" presetSubtype="0" fill="hold" grpId="0" nodeType="clickEffect">
+                                <p:cTn id="24" presetID="22" presetClass="entr" presetSubtype="8" fill="hold" grpId="0" nodeType="clickEffect">
                                   <p:stCondLst>
                                     <p:cond delay="0"/>
                                   </p:stCondLst>
@@ -24125,6 +24574,59 @@
                                     <p:set>
                                       <p:cBhvr>
                                         <p:cTn id="25" dur="1" fill="hold">
+                                          <p:stCondLst>
+                                            <p:cond delay="0"/>
+                                          </p:stCondLst>
+                                        </p:cTn>
+                                        <p:tgtEl>
+                                          <p:spTgt spid="8"/>
+                                        </p:tgtEl>
+                                        <p:attrNameLst>
+                                          <p:attrName>style.visibility</p:attrName>
+                                        </p:attrNameLst>
+                                      </p:cBhvr>
+                                      <p:to>
+                                        <p:strVal val="visible"/>
+                                      </p:to>
+                                    </p:set>
+                                    <p:animEffect transition="in" filter="wipe(left)">
+                                      <p:cBhvr>
+                                        <p:cTn id="26" dur="1000"/>
+                                        <p:tgtEl>
+                                          <p:spTgt spid="8"/>
+                                        </p:tgtEl>
+                                      </p:cBhvr>
+                                    </p:animEffect>
+                                  </p:childTnLst>
+                                </p:cTn>
+                              </p:par>
+                            </p:childTnLst>
+                          </p:cTn>
+                        </p:par>
+                      </p:childTnLst>
+                    </p:cTn>
+                  </p:par>
+                  <p:par>
+                    <p:cTn id="27" fill="hold">
+                      <p:stCondLst>
+                        <p:cond delay="indefinite"/>
+                      </p:stCondLst>
+                      <p:childTnLst>
+                        <p:par>
+                          <p:cTn id="28" fill="hold">
+                            <p:stCondLst>
+                              <p:cond delay="0"/>
+                            </p:stCondLst>
+                            <p:childTnLst>
+                              <p:par>
+                                <p:cTn id="29" presetID="1" presetClass="entr" presetSubtype="0" fill="hold" grpId="0" nodeType="clickEffect">
+                                  <p:stCondLst>
+                                    <p:cond delay="0"/>
+                                  </p:stCondLst>
+                                  <p:childTnLst>
+                                    <p:set>
+                                      <p:cBhvr>
+                                        <p:cTn id="30" dur="1" fill="hold">
                                           <p:stCondLst>
                                             <p:cond delay="0"/>
                                           </p:stCondLst>
@@ -27641,57 +28143,27 @@
               <a:rPr lang="en-US" sz="5400" dirty="0" smtClean="0">
                 <a:latin typeface="Comic Sans MS" pitchFamily="66" charset="0"/>
               </a:rPr>
-              <a:t> </a:t>
+              <a:t> Class prob.  </a:t>
+            </a:r>
+            <a:r>
+              <a:rPr lang="en-US" sz="5400" dirty="0">
+                <a:latin typeface="Comic Sans MS" pitchFamily="66" charset="0"/>
+              </a:rPr>
+              <a:t>A</a:t>
             </a:r>
             <a:r>
               <a:rPr lang="en-US" sz="5400" dirty="0" smtClean="0">
                 <a:latin typeface="Comic Sans MS" pitchFamily="66" charset="0"/>
               </a:rPr>
-              <a:t>Class prob</a:t>
-            </a:r>
+              <a:t>nother </a:t>
+            </a:r>
+          </a:p>
+          <a:p>
             <a:r>
               <a:rPr lang="en-US" sz="5400" dirty="0" smtClean="0">
                 <a:latin typeface="Comic Sans MS" pitchFamily="66" charset="0"/>
               </a:rPr>
-              <a:t>.  </a:t>
-            </a:r>
-            <a:r>
-              <a:rPr lang="en-US" sz="5400" dirty="0">
-                <a:latin typeface="Comic Sans MS" pitchFamily="66" charset="0"/>
-              </a:rPr>
-              <a:t>A</a:t>
-            </a:r>
-            <a:r>
-              <a:rPr lang="en-US" sz="5400" dirty="0" smtClean="0">
-                <a:latin typeface="Comic Sans MS" pitchFamily="66" charset="0"/>
-              </a:rPr>
-              <a:t>nother</a:t>
-            </a:r>
-            <a:r>
-              <a:rPr lang="en-US" sz="5400" dirty="0" smtClean="0">
-                <a:latin typeface="Comic Sans MS" pitchFamily="66" charset="0"/>
-              </a:rPr>
-              <a:t> </a:t>
-            </a:r>
-          </a:p>
-          <a:p>
-            <a:r>
-              <a:rPr lang="en-US" sz="5400" dirty="0" smtClean="0">
-                <a:latin typeface="Comic Sans MS" pitchFamily="66" charset="0"/>
-              </a:rPr>
-              <a:t>way later by</a:t>
-            </a:r>
-            <a:r>
-              <a:rPr lang="en-US" sz="5400" dirty="0" smtClean="0">
-                <a:latin typeface="Comic Sans MS" pitchFamily="66" charset="0"/>
-              </a:rPr>
-              <a:t> “counting</a:t>
-            </a:r>
-            <a:r>
-              <a:rPr lang="en-US" sz="5400" dirty="0" smtClean="0">
-                <a:latin typeface="Comic Sans MS" pitchFamily="66" charset="0"/>
-              </a:rPr>
-              <a:t>.”</a:t>
+              <a:t>way later by “counting.”</a:t>
             </a:r>
             <a:endParaRPr lang="en-US" sz="5400" dirty="0">
               <a:latin typeface="Comic Sans MS" pitchFamily="66" charset="0"/>
@@ -27999,12 +28471,6 @@
   <p:tag name="DEFAULTFONTSIZE" val="10"/>
   <p:tag name="DEFAULTWIDTH" val="446"/>
   <p:tag name="DEFAULTHEIGHT" val="328"/>
-</p:tagLst>
-</file>
-
-<file path=ppt/tags/tag2.xml><?xml version="1.0" encoding="utf-8"?>
-<p:tagLst xmlns:a="http://schemas.openxmlformats.org/drawingml/2006/main" xmlns:r="http://schemas.openxmlformats.org/officeDocument/2006/relationships" xmlns:mc="http://schemas.openxmlformats.org/markup-compatibility/2006" xmlns:mv="urn:schemas-microsoft-com:mac:vml" xmlns:p="http://schemas.openxmlformats.org/presentationml/2006/main" mc:Ignorable="mv" mc:PreserveAttributes="mv:*">
-  <p:tag name="HIDDENFONTSHAPE" val="true"/>
 </p:tagLst>
 </file>
 

</xml_diff>